<commit_message>
lecture files updated. added real life problems section
</commit_message>
<xml_diff>
--- a/Introduction to Python /lec01.pptx
+++ b/Introduction to Python /lec01.pptx
@@ -5,7 +5,7 @@
     <p:sldMasterId id="2147483648" r:id="rId1"/>
   </p:sldMasterIdLst>
   <p:notesMasterIdLst>
-    <p:notesMasterId r:id="rId24"/>
+    <p:notesMasterId r:id="rId26"/>
   </p:notesMasterIdLst>
   <p:sldIdLst>
     <p:sldId id="256" r:id="rId2"/>
@@ -14,22 +14,24 @@
     <p:sldId id="258" r:id="rId5"/>
     <p:sldId id="273" r:id="rId6"/>
     <p:sldId id="274" r:id="rId7"/>
-    <p:sldId id="275" r:id="rId8"/>
-    <p:sldId id="276" r:id="rId9"/>
-    <p:sldId id="271" r:id="rId10"/>
-    <p:sldId id="272" r:id="rId11"/>
-    <p:sldId id="277" r:id="rId12"/>
-    <p:sldId id="262" r:id="rId13"/>
-    <p:sldId id="260" r:id="rId14"/>
-    <p:sldId id="261" r:id="rId15"/>
-    <p:sldId id="263" r:id="rId16"/>
-    <p:sldId id="264" r:id="rId17"/>
-    <p:sldId id="265" r:id="rId18"/>
-    <p:sldId id="269" r:id="rId19"/>
-    <p:sldId id="266" r:id="rId20"/>
-    <p:sldId id="267" r:id="rId21"/>
-    <p:sldId id="268" r:id="rId22"/>
-    <p:sldId id="270" r:id="rId23"/>
+    <p:sldId id="278" r:id="rId8"/>
+    <p:sldId id="279" r:id="rId9"/>
+    <p:sldId id="275" r:id="rId10"/>
+    <p:sldId id="276" r:id="rId11"/>
+    <p:sldId id="271" r:id="rId12"/>
+    <p:sldId id="272" r:id="rId13"/>
+    <p:sldId id="277" r:id="rId14"/>
+    <p:sldId id="262" r:id="rId15"/>
+    <p:sldId id="260" r:id="rId16"/>
+    <p:sldId id="261" r:id="rId17"/>
+    <p:sldId id="263" r:id="rId18"/>
+    <p:sldId id="264" r:id="rId19"/>
+    <p:sldId id="265" r:id="rId20"/>
+    <p:sldId id="269" r:id="rId21"/>
+    <p:sldId id="266" r:id="rId22"/>
+    <p:sldId id="267" r:id="rId23"/>
+    <p:sldId id="268" r:id="rId24"/>
+    <p:sldId id="270" r:id="rId25"/>
   </p:sldIdLst>
   <p:sldSz cx="12192000" cy="6858000"/>
   <p:notesSz cx="6858000" cy="9144000"/>
@@ -2826,7 +2828,7 @@
           <a:p>
             <a:fld id="{2ABC0799-7251-C044-9682-4B0D99C9A35B}" type="datetimeFigureOut">
               <a:rPr lang="tr-TR" smtClean="0"/>
-              <a:t>23.11.2019</a:t>
+              <a:t>25.11.2019</a:t>
             </a:fld>
             <a:endParaRPr lang="tr-TR"/>
           </a:p>
@@ -6594,7 +6596,7 @@
           <p:cNvPr id="2" name="Title 1">
             <a:extLst>
               <a:ext uri="{FF2B5EF4-FFF2-40B4-BE49-F238E27FC236}">
-                <a16:creationId xmlns:a16="http://schemas.microsoft.com/office/drawing/2014/main" id="{C52F0A68-EB96-2643-B919-4635444A5CF3}"/>
+                <a16:creationId xmlns:a16="http://schemas.microsoft.com/office/drawing/2014/main" id="{D6233FA0-276B-5641-8FC4-647FCF530E63}"/>
               </a:ext>
             </a:extLst>
           </p:cNvPr>
@@ -6612,9 +6614,8 @@
           <a:p>
             <a:r>
               <a:rPr lang="tr-TR" dirty="0"/>
-              <a:t>Emirsel Bilgi</a:t>
-            </a:r>
-            <a:endParaRPr dirty="0"/>
+              <a:t>Nesne Tipleri</a:t>
+            </a:r>
           </a:p>
         </p:txBody>
       </p:sp>
@@ -6623,7 +6624,7 @@
           <p:cNvPr id="3" name="Content Placeholder 2">
             <a:extLst>
               <a:ext uri="{FF2B5EF4-FFF2-40B4-BE49-F238E27FC236}">
-                <a16:creationId xmlns:a16="http://schemas.microsoft.com/office/drawing/2014/main" id="{76210A91-6633-354D-AAF2-65546ED1E37E}"/>
+                <a16:creationId xmlns:a16="http://schemas.microsoft.com/office/drawing/2014/main" id="{FA4F0C0F-5F20-4B43-BE12-5B5D5618F3B1}"/>
               </a:ext>
             </a:extLst>
           </p:cNvPr>
@@ -6641,19 +6642,31 @@
           <a:p>
             <a:r>
               <a:rPr lang="tr-TR" dirty="0"/>
-              <a:t>Basit adımların sıralı bir şekilde verilmesi.</a:t>
-            </a:r>
-          </a:p>
-          <a:p>
+              <a:t>Skaler nesneler</a:t>
+            </a:r>
+          </a:p>
+          <a:p>
+            <a:pPr lvl="1"/>
             <a:r>
               <a:rPr lang="tr-TR" dirty="0"/>
-              <a:t>Kontrol akışı, gerçekleştirilen adımların sırasının belirtilmesi</a:t>
-            </a:r>
+              <a:t>Daha küçük parçalara bölünemeyen tip. Örneğin numaralar ve karakterler.</a:t>
+            </a:r>
+          </a:p>
+          <a:p>
+            <a:pPr lvl="1"/>
+            <a:endParaRPr lang="tr-TR" dirty="0"/>
           </a:p>
           <a:p>
             <a:r>
               <a:rPr lang="tr-TR" dirty="0"/>
-              <a:t>Programın duracağı zamanı belirlemek</a:t>
+              <a:t>Skaler olmayan nesneler</a:t>
+            </a:r>
+          </a:p>
+          <a:p>
+            <a:pPr lvl="1"/>
+            <a:r>
+              <a:rPr lang="tr-TR" dirty="0"/>
+              <a:t>Daha küçük parçalara ayrılabilen nesneler. Örneğin Listeler.</a:t>
             </a:r>
           </a:p>
         </p:txBody>
@@ -6663,7 +6676,7 @@
           <p:cNvPr id="4" name="Date Placeholder 3">
             <a:extLst>
               <a:ext uri="{FF2B5EF4-FFF2-40B4-BE49-F238E27FC236}">
-                <a16:creationId xmlns:a16="http://schemas.microsoft.com/office/drawing/2014/main" id="{3A25CC33-837A-5444-B191-A6DAD8374EC0}"/>
+                <a16:creationId xmlns:a16="http://schemas.microsoft.com/office/drawing/2014/main" id="{10915C89-F4E9-1047-B209-67C619CC86CC}"/>
               </a:ext>
             </a:extLst>
           </p:cNvPr>
@@ -6692,7 +6705,7 @@
           <p:cNvPr id="5" name="Slide Number Placeholder 4">
             <a:extLst>
               <a:ext uri="{FF2B5EF4-FFF2-40B4-BE49-F238E27FC236}">
-                <a16:creationId xmlns:a16="http://schemas.microsoft.com/office/drawing/2014/main" id="{A14D77BC-1C9D-A54B-91A3-FB6967302CAD}"/>
+                <a16:creationId xmlns:a16="http://schemas.microsoft.com/office/drawing/2014/main" id="{C7CA4345-7CD2-5546-BA34-32EB80B1D069}"/>
               </a:ext>
             </a:extLst>
           </p:cNvPr>
@@ -6719,7 +6732,7 @@
     </p:spTree>
     <p:extLst>
       <p:ext uri="{BB962C8B-B14F-4D97-AF65-F5344CB8AC3E}">
-        <p14:creationId xmlns:p14="http://schemas.microsoft.com/office/powerpoint/2010/main" val="848420845"/>
+        <p14:creationId xmlns:p14="http://schemas.microsoft.com/office/powerpoint/2010/main" val="956917466"/>
       </p:ext>
     </p:extLst>
   </p:cSld>
@@ -6751,7 +6764,7 @@
           <p:cNvPr id="2" name="Title 1">
             <a:extLst>
               <a:ext uri="{FF2B5EF4-FFF2-40B4-BE49-F238E27FC236}">
-                <a16:creationId xmlns:a16="http://schemas.microsoft.com/office/drawing/2014/main" id="{6C1A919E-7C02-2F40-82B5-77D423356187}"/>
+                <a16:creationId xmlns:a16="http://schemas.microsoft.com/office/drawing/2014/main" id="{F4015C51-6854-FA47-ABE8-708AF75CE8D6}"/>
               </a:ext>
             </a:extLst>
           </p:cNvPr>
@@ -6768,36 +6781,83 @@
           <a:lstStyle/>
           <a:p>
             <a:r>
+              <a:rPr lang="en-US" dirty="0"/>
+              <a:t>Bilgi Tipleri </a:t>
+            </a:r>
+            <a:endParaRPr dirty="0"/>
+          </a:p>
+        </p:txBody>
+      </p:sp>
+      <p:sp>
+        <p:nvSpPr>
+          <p:cNvPr id="3" name="Content Placeholder 2">
+            <a:extLst>
+              <a:ext uri="{FF2B5EF4-FFF2-40B4-BE49-F238E27FC236}">
+                <a16:creationId xmlns:a16="http://schemas.microsoft.com/office/drawing/2014/main" id="{5839892F-1FCA-2049-8A37-4A8130C0B3CE}"/>
+              </a:ext>
+            </a:extLst>
+          </p:cNvPr>
+          <p:cNvSpPr>
+            <a:spLocks noGrp="1"/>
+          </p:cNvSpPr>
+          <p:nvPr>
+            <p:ph idx="1"/>
+          </p:nvPr>
+        </p:nvSpPr>
+        <p:spPr/>
+        <p:txBody>
+          <a:bodyPr>
+            <a:normAutofit/>
+          </a:bodyPr>
+          <a:lstStyle/>
+          <a:p>
+            <a:pPr marL="0" indent="0">
+              <a:buNone/>
+            </a:pPr>
+            <a:r>
               <a:rPr lang="tr-TR" dirty="0"/>
-              <a:t>Kontrol Akışı</a:t>
-            </a:r>
-          </a:p>
-        </p:txBody>
-      </p:sp>
-      <p:sp>
-        <p:nvSpPr>
-          <p:cNvPr id="3" name="Content Placeholder 2">
-            <a:extLst>
-              <a:ext uri="{FF2B5EF4-FFF2-40B4-BE49-F238E27FC236}">
-                <a16:creationId xmlns:a16="http://schemas.microsoft.com/office/drawing/2014/main" id="{24DB90ED-8A9B-AC48-B418-9CEF7E64C3DA}"/>
-              </a:ext>
-            </a:extLst>
-          </p:cNvPr>
-          <p:cNvSpPr>
-            <a:spLocks noGrp="1"/>
-          </p:cNvSpPr>
-          <p:nvPr>
-            <p:ph idx="1"/>
-          </p:nvPr>
-        </p:nvSpPr>
-        <p:spPr/>
-        <p:txBody>
-          <a:bodyPr/>
-          <a:lstStyle/>
-          <a:p>
+              <a:t>Bildirimsel Bilgi</a:t>
+            </a:r>
+          </a:p>
+          <a:p>
+            <a:pPr lvl="1"/>
             <a:r>
               <a:rPr lang="tr-TR" dirty="0"/>
-              <a:t>Programlamada, kontrol akışı fonksiyon çağrılarını, talimatları ve ifadelerin gerçekleşme sırasını kontrol eder.</a:t>
+              <a:t>Gerçeklerin ifade edilmesi. Örneğin ’Ders sonunda bir kişi kahve kazanacak.’</a:t>
+            </a:r>
+          </a:p>
+          <a:p>
+            <a:pPr lvl="1"/>
+            <a:endParaRPr lang="tr-TR" dirty="0"/>
+          </a:p>
+          <a:p>
+            <a:pPr marL="0" indent="0">
+              <a:buNone/>
+            </a:pPr>
+            <a:r>
+              <a:rPr lang="tr-TR" dirty="0"/>
+              <a:t>Emirsel Bilgi</a:t>
+            </a:r>
+          </a:p>
+          <a:p>
+            <a:pPr lvl="1"/>
+            <a:r>
+              <a:rPr lang="tr-TR" dirty="0"/>
+              <a:t>Bir tarif verilmesi veya nasıl yapılacağının belirtilmesi.</a:t>
+            </a:r>
+          </a:p>
+          <a:p>
+            <a:pPr lvl="2"/>
+            <a:r>
+              <a:rPr lang="tr-TR" dirty="0"/>
+              <a:t>1- Batuhan Python üzerinden rastgele bir sayı üretir.</a:t>
+            </a:r>
+          </a:p>
+          <a:p>
+            <a:pPr lvl="2"/>
+            <a:r>
+              <a:rPr lang="tr-TR" dirty="0"/>
+              <a:t>2- Batuhan kişi listesinden sayıyı bulur ve kazananı belirler.</a:t>
             </a:r>
           </a:p>
         </p:txBody>
@@ -6807,7 +6867,7 @@
           <p:cNvPr id="4" name="Date Placeholder 3">
             <a:extLst>
               <a:ext uri="{FF2B5EF4-FFF2-40B4-BE49-F238E27FC236}">
-                <a16:creationId xmlns:a16="http://schemas.microsoft.com/office/drawing/2014/main" id="{7E0A08CF-C071-8048-AD7E-2AED6B9F1063}"/>
+                <a16:creationId xmlns:a16="http://schemas.microsoft.com/office/drawing/2014/main" id="{15BF110A-69F9-BF4D-B391-B27C78BA3EC5}"/>
               </a:ext>
             </a:extLst>
           </p:cNvPr>
@@ -6836,7 +6896,7 @@
           <p:cNvPr id="5" name="Slide Number Placeholder 4">
             <a:extLst>
               <a:ext uri="{FF2B5EF4-FFF2-40B4-BE49-F238E27FC236}">
-                <a16:creationId xmlns:a16="http://schemas.microsoft.com/office/drawing/2014/main" id="{9A18630F-2BBF-6F43-B2E4-8C4A3CFA8687}"/>
+                <a16:creationId xmlns:a16="http://schemas.microsoft.com/office/drawing/2014/main" id="{6A634B4C-18E4-3F42-9685-D3CFB4337D3F}"/>
               </a:ext>
             </a:extLst>
           </p:cNvPr>
@@ -6863,13 +6923,341 @@
     </p:spTree>
     <p:extLst>
       <p:ext uri="{BB962C8B-B14F-4D97-AF65-F5344CB8AC3E}">
-        <p14:creationId xmlns:p14="http://schemas.microsoft.com/office/powerpoint/2010/main" val="3517415651"/>
+        <p14:creationId xmlns:p14="http://schemas.microsoft.com/office/powerpoint/2010/main" val="1118790915"/>
       </p:ext>
     </p:extLst>
   </p:cSld>
   <p:clrMapOvr>
     <a:masterClrMapping/>
   </p:clrMapOvr>
+  <p:timing>
+    <p:tnLst>
+      <p:par>
+        <p:cTn id="1" dur="indefinite" restart="never" nodeType="tmRoot">
+          <p:childTnLst>
+            <p:seq concurrent="1" nextAc="seek">
+              <p:cTn id="2" dur="indefinite" nodeType="mainSeq">
+                <p:childTnLst>
+                  <p:par>
+                    <p:cTn id="3" fill="hold">
+                      <p:stCondLst>
+                        <p:cond delay="indefinite"/>
+                      </p:stCondLst>
+                      <p:childTnLst>
+                        <p:par>
+                          <p:cTn id="4" fill="hold">
+                            <p:stCondLst>
+                              <p:cond delay="0"/>
+                            </p:stCondLst>
+                            <p:childTnLst>
+                              <p:par>
+                                <p:cTn id="5" presetID="12" presetClass="entr" presetSubtype="4" fill="hold" nodeType="clickEffect">
+                                  <p:stCondLst>
+                                    <p:cond delay="0"/>
+                                  </p:stCondLst>
+                                  <p:childTnLst>
+                                    <p:set>
+                                      <p:cBhvr>
+                                        <p:cTn id="6" dur="1" fill="hold">
+                                          <p:stCondLst>
+                                            <p:cond delay="0"/>
+                                          </p:stCondLst>
+                                        </p:cTn>
+                                        <p:tgtEl>
+                                          <p:spTgt spid="3">
+                                            <p:txEl>
+                                              <p:pRg st="3" end="3"/>
+                                            </p:txEl>
+                                          </p:spTgt>
+                                        </p:tgtEl>
+                                        <p:attrNameLst>
+                                          <p:attrName>style.visibility</p:attrName>
+                                        </p:attrNameLst>
+                                      </p:cBhvr>
+                                      <p:to>
+                                        <p:strVal val="visible"/>
+                                      </p:to>
+                                    </p:set>
+                                    <p:anim calcmode="lin" valueType="num">
+                                      <p:cBhvr additive="base">
+                                        <p:cTn id="7" dur="500"/>
+                                        <p:tgtEl>
+                                          <p:spTgt spid="3">
+                                            <p:txEl>
+                                              <p:pRg st="3" end="3"/>
+                                            </p:txEl>
+                                          </p:spTgt>
+                                        </p:tgtEl>
+                                        <p:attrNameLst>
+                                          <p:attrName>ppt_y</p:attrName>
+                                        </p:attrNameLst>
+                                      </p:cBhvr>
+                                      <p:tavLst>
+                                        <p:tav tm="0">
+                                          <p:val>
+                                            <p:strVal val="#ppt_y+#ppt_h*1.125000"/>
+                                          </p:val>
+                                        </p:tav>
+                                        <p:tav tm="100000">
+                                          <p:val>
+                                            <p:strVal val="#ppt_y"/>
+                                          </p:val>
+                                        </p:tav>
+                                      </p:tavLst>
+                                    </p:anim>
+                                    <p:animEffect transition="in" filter="wipe(up)">
+                                      <p:cBhvr>
+                                        <p:cTn id="8" dur="500"/>
+                                        <p:tgtEl>
+                                          <p:spTgt spid="3">
+                                            <p:txEl>
+                                              <p:pRg st="3" end="3"/>
+                                            </p:txEl>
+                                          </p:spTgt>
+                                        </p:tgtEl>
+                                      </p:cBhvr>
+                                    </p:animEffect>
+                                  </p:childTnLst>
+                                </p:cTn>
+                              </p:par>
+                              <p:par>
+                                <p:cTn id="9" presetID="12" presetClass="entr" presetSubtype="4" fill="hold" nodeType="withEffect">
+                                  <p:stCondLst>
+                                    <p:cond delay="0"/>
+                                  </p:stCondLst>
+                                  <p:childTnLst>
+                                    <p:set>
+                                      <p:cBhvr>
+                                        <p:cTn id="10" dur="1" fill="hold">
+                                          <p:stCondLst>
+                                            <p:cond delay="0"/>
+                                          </p:stCondLst>
+                                        </p:cTn>
+                                        <p:tgtEl>
+                                          <p:spTgt spid="3">
+                                            <p:txEl>
+                                              <p:pRg st="4" end="4"/>
+                                            </p:txEl>
+                                          </p:spTgt>
+                                        </p:tgtEl>
+                                        <p:attrNameLst>
+                                          <p:attrName>style.visibility</p:attrName>
+                                        </p:attrNameLst>
+                                      </p:cBhvr>
+                                      <p:to>
+                                        <p:strVal val="visible"/>
+                                      </p:to>
+                                    </p:set>
+                                    <p:anim calcmode="lin" valueType="num">
+                                      <p:cBhvr additive="base">
+                                        <p:cTn id="11" dur="500"/>
+                                        <p:tgtEl>
+                                          <p:spTgt spid="3">
+                                            <p:txEl>
+                                              <p:pRg st="4" end="4"/>
+                                            </p:txEl>
+                                          </p:spTgt>
+                                        </p:tgtEl>
+                                        <p:attrNameLst>
+                                          <p:attrName>ppt_y</p:attrName>
+                                        </p:attrNameLst>
+                                      </p:cBhvr>
+                                      <p:tavLst>
+                                        <p:tav tm="0">
+                                          <p:val>
+                                            <p:strVal val="#ppt_y+#ppt_h*1.125000"/>
+                                          </p:val>
+                                        </p:tav>
+                                        <p:tav tm="100000">
+                                          <p:val>
+                                            <p:strVal val="#ppt_y"/>
+                                          </p:val>
+                                        </p:tav>
+                                      </p:tavLst>
+                                    </p:anim>
+                                    <p:animEffect transition="in" filter="wipe(up)">
+                                      <p:cBhvr>
+                                        <p:cTn id="12" dur="500"/>
+                                        <p:tgtEl>
+                                          <p:spTgt spid="3">
+                                            <p:txEl>
+                                              <p:pRg st="4" end="4"/>
+                                            </p:txEl>
+                                          </p:spTgt>
+                                        </p:tgtEl>
+                                      </p:cBhvr>
+                                    </p:animEffect>
+                                  </p:childTnLst>
+                                </p:cTn>
+                              </p:par>
+                              <p:par>
+                                <p:cTn id="13" presetID="12" presetClass="entr" presetSubtype="4" fill="hold" nodeType="withEffect">
+                                  <p:stCondLst>
+                                    <p:cond delay="0"/>
+                                  </p:stCondLst>
+                                  <p:childTnLst>
+                                    <p:set>
+                                      <p:cBhvr>
+                                        <p:cTn id="14" dur="1" fill="hold">
+                                          <p:stCondLst>
+                                            <p:cond delay="0"/>
+                                          </p:stCondLst>
+                                        </p:cTn>
+                                        <p:tgtEl>
+                                          <p:spTgt spid="3">
+                                            <p:txEl>
+                                              <p:pRg st="5" end="5"/>
+                                            </p:txEl>
+                                          </p:spTgt>
+                                        </p:tgtEl>
+                                        <p:attrNameLst>
+                                          <p:attrName>style.visibility</p:attrName>
+                                        </p:attrNameLst>
+                                      </p:cBhvr>
+                                      <p:to>
+                                        <p:strVal val="visible"/>
+                                      </p:to>
+                                    </p:set>
+                                    <p:anim calcmode="lin" valueType="num">
+                                      <p:cBhvr additive="base">
+                                        <p:cTn id="15" dur="500"/>
+                                        <p:tgtEl>
+                                          <p:spTgt spid="3">
+                                            <p:txEl>
+                                              <p:pRg st="5" end="5"/>
+                                            </p:txEl>
+                                          </p:spTgt>
+                                        </p:tgtEl>
+                                        <p:attrNameLst>
+                                          <p:attrName>ppt_y</p:attrName>
+                                        </p:attrNameLst>
+                                      </p:cBhvr>
+                                      <p:tavLst>
+                                        <p:tav tm="0">
+                                          <p:val>
+                                            <p:strVal val="#ppt_y+#ppt_h*1.125000"/>
+                                          </p:val>
+                                        </p:tav>
+                                        <p:tav tm="100000">
+                                          <p:val>
+                                            <p:strVal val="#ppt_y"/>
+                                          </p:val>
+                                        </p:tav>
+                                      </p:tavLst>
+                                    </p:anim>
+                                    <p:animEffect transition="in" filter="wipe(up)">
+                                      <p:cBhvr>
+                                        <p:cTn id="16" dur="500"/>
+                                        <p:tgtEl>
+                                          <p:spTgt spid="3">
+                                            <p:txEl>
+                                              <p:pRg st="5" end="5"/>
+                                            </p:txEl>
+                                          </p:spTgt>
+                                        </p:tgtEl>
+                                      </p:cBhvr>
+                                    </p:animEffect>
+                                  </p:childTnLst>
+                                </p:cTn>
+                              </p:par>
+                              <p:par>
+                                <p:cTn id="17" presetID="12" presetClass="entr" presetSubtype="4" fill="hold" nodeType="withEffect">
+                                  <p:stCondLst>
+                                    <p:cond delay="0"/>
+                                  </p:stCondLst>
+                                  <p:childTnLst>
+                                    <p:set>
+                                      <p:cBhvr>
+                                        <p:cTn id="18" dur="1" fill="hold">
+                                          <p:stCondLst>
+                                            <p:cond delay="0"/>
+                                          </p:stCondLst>
+                                        </p:cTn>
+                                        <p:tgtEl>
+                                          <p:spTgt spid="3">
+                                            <p:txEl>
+                                              <p:pRg st="6" end="6"/>
+                                            </p:txEl>
+                                          </p:spTgt>
+                                        </p:tgtEl>
+                                        <p:attrNameLst>
+                                          <p:attrName>style.visibility</p:attrName>
+                                        </p:attrNameLst>
+                                      </p:cBhvr>
+                                      <p:to>
+                                        <p:strVal val="visible"/>
+                                      </p:to>
+                                    </p:set>
+                                    <p:anim calcmode="lin" valueType="num">
+                                      <p:cBhvr additive="base">
+                                        <p:cTn id="19" dur="500"/>
+                                        <p:tgtEl>
+                                          <p:spTgt spid="3">
+                                            <p:txEl>
+                                              <p:pRg st="6" end="6"/>
+                                            </p:txEl>
+                                          </p:spTgt>
+                                        </p:tgtEl>
+                                        <p:attrNameLst>
+                                          <p:attrName>ppt_y</p:attrName>
+                                        </p:attrNameLst>
+                                      </p:cBhvr>
+                                      <p:tavLst>
+                                        <p:tav tm="0">
+                                          <p:val>
+                                            <p:strVal val="#ppt_y+#ppt_h*1.125000"/>
+                                          </p:val>
+                                        </p:tav>
+                                        <p:tav tm="100000">
+                                          <p:val>
+                                            <p:strVal val="#ppt_y"/>
+                                          </p:val>
+                                        </p:tav>
+                                      </p:tavLst>
+                                    </p:anim>
+                                    <p:animEffect transition="in" filter="wipe(up)">
+                                      <p:cBhvr>
+                                        <p:cTn id="20" dur="500"/>
+                                        <p:tgtEl>
+                                          <p:spTgt spid="3">
+                                            <p:txEl>
+                                              <p:pRg st="6" end="6"/>
+                                            </p:txEl>
+                                          </p:spTgt>
+                                        </p:tgtEl>
+                                      </p:cBhvr>
+                                    </p:animEffect>
+                                  </p:childTnLst>
+                                </p:cTn>
+                              </p:par>
+                            </p:childTnLst>
+                          </p:cTn>
+                        </p:par>
+                      </p:childTnLst>
+                    </p:cTn>
+                  </p:par>
+                </p:childTnLst>
+              </p:cTn>
+              <p:prevCondLst>
+                <p:cond evt="onPrev" delay="0">
+                  <p:tgtEl>
+                    <p:sldTgt/>
+                  </p:tgtEl>
+                </p:cond>
+              </p:prevCondLst>
+              <p:nextCondLst>
+                <p:cond evt="onNext" delay="0">
+                  <p:tgtEl>
+                    <p:sldTgt/>
+                  </p:tgtEl>
+                </p:cond>
+              </p:nextCondLst>
+            </p:seq>
+          </p:childTnLst>
+        </p:cTn>
+      </p:par>
+    </p:tnLst>
+  </p:timing>
 </p:sld>
 </file>
 
@@ -6892,6 +7280,307 @@
       </p:grpSpPr>
       <p:sp>
         <p:nvSpPr>
+          <p:cNvPr id="2" name="Title 1">
+            <a:extLst>
+              <a:ext uri="{FF2B5EF4-FFF2-40B4-BE49-F238E27FC236}">
+                <a16:creationId xmlns:a16="http://schemas.microsoft.com/office/drawing/2014/main" id="{C52F0A68-EB96-2643-B919-4635444A5CF3}"/>
+              </a:ext>
+            </a:extLst>
+          </p:cNvPr>
+          <p:cNvSpPr>
+            <a:spLocks noGrp="1"/>
+          </p:cNvSpPr>
+          <p:nvPr>
+            <p:ph type="title"/>
+          </p:nvPr>
+        </p:nvSpPr>
+        <p:spPr/>
+        <p:txBody>
+          <a:bodyPr/>
+          <a:lstStyle/>
+          <a:p>
+            <a:r>
+              <a:rPr lang="tr-TR" dirty="0"/>
+              <a:t>Emirsel Bilgi</a:t>
+            </a:r>
+            <a:endParaRPr dirty="0"/>
+          </a:p>
+        </p:txBody>
+      </p:sp>
+      <p:sp>
+        <p:nvSpPr>
+          <p:cNvPr id="3" name="Content Placeholder 2">
+            <a:extLst>
+              <a:ext uri="{FF2B5EF4-FFF2-40B4-BE49-F238E27FC236}">
+                <a16:creationId xmlns:a16="http://schemas.microsoft.com/office/drawing/2014/main" id="{76210A91-6633-354D-AAF2-65546ED1E37E}"/>
+              </a:ext>
+            </a:extLst>
+          </p:cNvPr>
+          <p:cNvSpPr>
+            <a:spLocks noGrp="1"/>
+          </p:cNvSpPr>
+          <p:nvPr>
+            <p:ph idx="1"/>
+          </p:nvPr>
+        </p:nvSpPr>
+        <p:spPr/>
+        <p:txBody>
+          <a:bodyPr/>
+          <a:lstStyle/>
+          <a:p>
+            <a:r>
+              <a:rPr lang="tr-TR" dirty="0"/>
+              <a:t>Basit adımların sıralı bir şekilde verilmesi.</a:t>
+            </a:r>
+          </a:p>
+          <a:p>
+            <a:r>
+              <a:rPr lang="tr-TR" dirty="0"/>
+              <a:t>Kontrol akışı, gerçekleştirilen adımların sırasının belirtilmesi</a:t>
+            </a:r>
+          </a:p>
+          <a:p>
+            <a:r>
+              <a:rPr lang="tr-TR" dirty="0"/>
+              <a:t>Programın duracağı zamanı belirlemek</a:t>
+            </a:r>
+          </a:p>
+        </p:txBody>
+      </p:sp>
+      <p:sp>
+        <p:nvSpPr>
+          <p:cNvPr id="4" name="Date Placeholder 3">
+            <a:extLst>
+              <a:ext uri="{FF2B5EF4-FFF2-40B4-BE49-F238E27FC236}">
+                <a16:creationId xmlns:a16="http://schemas.microsoft.com/office/drawing/2014/main" id="{3A25CC33-837A-5444-B191-A6DAD8374EC0}"/>
+              </a:ext>
+            </a:extLst>
+          </p:cNvPr>
+          <p:cNvSpPr>
+            <a:spLocks noGrp="1"/>
+          </p:cNvSpPr>
+          <p:nvPr>
+            <p:ph type="dt" sz="half" idx="10"/>
+          </p:nvPr>
+        </p:nvSpPr>
+        <p:spPr/>
+        <p:txBody>
+          <a:bodyPr/>
+          <a:lstStyle/>
+          <a:p>
+            <a:r>
+              <a:rPr lang="tr-TR"/>
+              <a:t>Medical Artificial Intelligence</a:t>
+            </a:r>
+            <a:endParaRPr lang="tr-TR" dirty="0"/>
+          </a:p>
+        </p:txBody>
+      </p:sp>
+      <p:sp>
+        <p:nvSpPr>
+          <p:cNvPr id="5" name="Slide Number Placeholder 4">
+            <a:extLst>
+              <a:ext uri="{FF2B5EF4-FFF2-40B4-BE49-F238E27FC236}">
+                <a16:creationId xmlns:a16="http://schemas.microsoft.com/office/drawing/2014/main" id="{A14D77BC-1C9D-A54B-91A3-FB6967302CAD}"/>
+              </a:ext>
+            </a:extLst>
+          </p:cNvPr>
+          <p:cNvSpPr>
+            <a:spLocks noGrp="1"/>
+          </p:cNvSpPr>
+          <p:nvPr>
+            <p:ph type="sldNum" sz="quarter" idx="12"/>
+          </p:nvPr>
+        </p:nvSpPr>
+        <p:spPr/>
+        <p:txBody>
+          <a:bodyPr/>
+          <a:lstStyle/>
+          <a:p>
+            <a:fld id="{4119457A-5965-C148-8898-E00E7A560E34}" type="slidenum">
+              <a:rPr lang="tr-TR" smtClean="0"/>
+              <a:t>12</a:t>
+            </a:fld>
+            <a:endParaRPr lang="tr-TR" dirty="0"/>
+          </a:p>
+        </p:txBody>
+      </p:sp>
+    </p:spTree>
+    <p:extLst>
+      <p:ext uri="{BB962C8B-B14F-4D97-AF65-F5344CB8AC3E}">
+        <p14:creationId xmlns:p14="http://schemas.microsoft.com/office/powerpoint/2010/main" val="848420845"/>
+      </p:ext>
+    </p:extLst>
+  </p:cSld>
+  <p:clrMapOvr>
+    <a:masterClrMapping/>
+  </p:clrMapOvr>
+</p:sld>
+</file>
+
+<file path=ppt/slides/slide13.xml><?xml version="1.0" encoding="utf-8"?>
+<p:sld xmlns:a="http://schemas.openxmlformats.org/drawingml/2006/main" xmlns:r="http://schemas.openxmlformats.org/officeDocument/2006/relationships" xmlns:p="http://schemas.openxmlformats.org/presentationml/2006/main">
+  <p:cSld>
+    <p:spTree>
+      <p:nvGrpSpPr>
+        <p:cNvPr id="1" name=""/>
+        <p:cNvGrpSpPr/>
+        <p:nvPr/>
+      </p:nvGrpSpPr>
+      <p:grpSpPr>
+        <a:xfrm>
+          <a:off x="0" y="0"/>
+          <a:ext cx="0" cy="0"/>
+          <a:chOff x="0" y="0"/>
+          <a:chExt cx="0" cy="0"/>
+        </a:xfrm>
+      </p:grpSpPr>
+      <p:sp>
+        <p:nvSpPr>
+          <p:cNvPr id="2" name="Title 1">
+            <a:extLst>
+              <a:ext uri="{FF2B5EF4-FFF2-40B4-BE49-F238E27FC236}">
+                <a16:creationId xmlns:a16="http://schemas.microsoft.com/office/drawing/2014/main" id="{6C1A919E-7C02-2F40-82B5-77D423356187}"/>
+              </a:ext>
+            </a:extLst>
+          </p:cNvPr>
+          <p:cNvSpPr>
+            <a:spLocks noGrp="1"/>
+          </p:cNvSpPr>
+          <p:nvPr>
+            <p:ph type="title"/>
+          </p:nvPr>
+        </p:nvSpPr>
+        <p:spPr/>
+        <p:txBody>
+          <a:bodyPr/>
+          <a:lstStyle/>
+          <a:p>
+            <a:r>
+              <a:rPr lang="tr-TR" dirty="0"/>
+              <a:t>Kontrol Akışı</a:t>
+            </a:r>
+          </a:p>
+        </p:txBody>
+      </p:sp>
+      <p:sp>
+        <p:nvSpPr>
+          <p:cNvPr id="3" name="Content Placeholder 2">
+            <a:extLst>
+              <a:ext uri="{FF2B5EF4-FFF2-40B4-BE49-F238E27FC236}">
+                <a16:creationId xmlns:a16="http://schemas.microsoft.com/office/drawing/2014/main" id="{24DB90ED-8A9B-AC48-B418-9CEF7E64C3DA}"/>
+              </a:ext>
+            </a:extLst>
+          </p:cNvPr>
+          <p:cNvSpPr>
+            <a:spLocks noGrp="1"/>
+          </p:cNvSpPr>
+          <p:nvPr>
+            <p:ph idx="1"/>
+          </p:nvPr>
+        </p:nvSpPr>
+        <p:spPr/>
+        <p:txBody>
+          <a:bodyPr/>
+          <a:lstStyle/>
+          <a:p>
+            <a:r>
+              <a:rPr lang="tr-TR" dirty="0"/>
+              <a:t>Programlamada, kontrol akışı fonksiyon çağrılarını, talimatları ve ifadelerin gerçekleşme sırasını kontrol eder.</a:t>
+            </a:r>
+          </a:p>
+        </p:txBody>
+      </p:sp>
+      <p:sp>
+        <p:nvSpPr>
+          <p:cNvPr id="4" name="Date Placeholder 3">
+            <a:extLst>
+              <a:ext uri="{FF2B5EF4-FFF2-40B4-BE49-F238E27FC236}">
+                <a16:creationId xmlns:a16="http://schemas.microsoft.com/office/drawing/2014/main" id="{7E0A08CF-C071-8048-AD7E-2AED6B9F1063}"/>
+              </a:ext>
+            </a:extLst>
+          </p:cNvPr>
+          <p:cNvSpPr>
+            <a:spLocks noGrp="1"/>
+          </p:cNvSpPr>
+          <p:nvPr>
+            <p:ph type="dt" sz="half" idx="10"/>
+          </p:nvPr>
+        </p:nvSpPr>
+        <p:spPr/>
+        <p:txBody>
+          <a:bodyPr/>
+          <a:lstStyle/>
+          <a:p>
+            <a:r>
+              <a:rPr lang="tr-TR"/>
+              <a:t>Medical Artificial Intelligence</a:t>
+            </a:r>
+            <a:endParaRPr lang="tr-TR" dirty="0"/>
+          </a:p>
+        </p:txBody>
+      </p:sp>
+      <p:sp>
+        <p:nvSpPr>
+          <p:cNvPr id="5" name="Slide Number Placeholder 4">
+            <a:extLst>
+              <a:ext uri="{FF2B5EF4-FFF2-40B4-BE49-F238E27FC236}">
+                <a16:creationId xmlns:a16="http://schemas.microsoft.com/office/drawing/2014/main" id="{9A18630F-2BBF-6F43-B2E4-8C4A3CFA8687}"/>
+              </a:ext>
+            </a:extLst>
+          </p:cNvPr>
+          <p:cNvSpPr>
+            <a:spLocks noGrp="1"/>
+          </p:cNvSpPr>
+          <p:nvPr>
+            <p:ph type="sldNum" sz="quarter" idx="12"/>
+          </p:nvPr>
+        </p:nvSpPr>
+        <p:spPr/>
+        <p:txBody>
+          <a:bodyPr/>
+          <a:lstStyle/>
+          <a:p>
+            <a:fld id="{4119457A-5965-C148-8898-E00E7A560E34}" type="slidenum">
+              <a:rPr lang="tr-TR" smtClean="0"/>
+              <a:t>13</a:t>
+            </a:fld>
+            <a:endParaRPr lang="tr-TR" dirty="0"/>
+          </a:p>
+        </p:txBody>
+      </p:sp>
+    </p:spTree>
+    <p:extLst>
+      <p:ext uri="{BB962C8B-B14F-4D97-AF65-F5344CB8AC3E}">
+        <p14:creationId xmlns:p14="http://schemas.microsoft.com/office/powerpoint/2010/main" val="3517415651"/>
+      </p:ext>
+    </p:extLst>
+  </p:cSld>
+  <p:clrMapOvr>
+    <a:masterClrMapping/>
+  </p:clrMapOvr>
+</p:sld>
+</file>
+
+<file path=ppt/slides/slide14.xml><?xml version="1.0" encoding="utf-8"?>
+<p:sld xmlns:a="http://schemas.openxmlformats.org/drawingml/2006/main" xmlns:r="http://schemas.openxmlformats.org/officeDocument/2006/relationships" xmlns:p="http://schemas.openxmlformats.org/presentationml/2006/main">
+  <p:cSld>
+    <p:spTree>
+      <p:nvGrpSpPr>
+        <p:cNvPr id="1" name=""/>
+        <p:cNvGrpSpPr/>
+        <p:nvPr/>
+      </p:nvGrpSpPr>
+      <p:grpSpPr>
+        <a:xfrm>
+          <a:off x="0" y="0"/>
+          <a:ext cx="0" cy="0"/>
+          <a:chOff x="0" y="0"/>
+          <a:chExt cx="0" cy="0"/>
+        </a:xfrm>
+      </p:grpSpPr>
+      <p:sp>
+        <p:nvSpPr>
           <p:cNvPr id="4" name="Date Placeholder 3">
             <a:extLst>
               <a:ext uri="{FF2B5EF4-FFF2-40B4-BE49-F238E27FC236}">
@@ -6952,7 +7641,7 @@
           <a:p>
             <a:fld id="{4119457A-5965-C148-8898-E00E7A560E34}" type="slidenum">
               <a:rPr lang="tr-TR" smtClean="0"/>
-              <a:t>12</a:t>
+              <a:t>14</a:t>
             </a:fld>
             <a:endParaRPr lang="tr-TR" dirty="0"/>
           </a:p>
@@ -7001,354 +7690,6 @@
 </p:sld>
 </file>
 
-<file path=ppt/slides/slide13.xml><?xml version="1.0" encoding="utf-8"?>
-<p:sld xmlns:a="http://schemas.openxmlformats.org/drawingml/2006/main" xmlns:r="http://schemas.openxmlformats.org/officeDocument/2006/relationships" xmlns:p="http://schemas.openxmlformats.org/presentationml/2006/main">
-  <p:cSld>
-    <p:spTree>
-      <p:nvGrpSpPr>
-        <p:cNvPr id="1" name=""/>
-        <p:cNvGrpSpPr/>
-        <p:nvPr/>
-      </p:nvGrpSpPr>
-      <p:grpSpPr>
-        <a:xfrm>
-          <a:off x="0" y="0"/>
-          <a:ext cx="0" cy="0"/>
-          <a:chOff x="0" y="0"/>
-          <a:chExt cx="0" cy="0"/>
-        </a:xfrm>
-      </p:grpSpPr>
-      <p:sp>
-        <p:nvSpPr>
-          <p:cNvPr id="2" name="Title 1">
-            <a:extLst>
-              <a:ext uri="{FF2B5EF4-FFF2-40B4-BE49-F238E27FC236}">
-                <a16:creationId xmlns:a16="http://schemas.microsoft.com/office/drawing/2014/main" id="{042929B4-0CFC-1146-8BBD-A9BE4EACE90D}"/>
-              </a:ext>
-            </a:extLst>
-          </p:cNvPr>
-          <p:cNvSpPr>
-            <a:spLocks noGrp="1"/>
-          </p:cNvSpPr>
-          <p:nvPr>
-            <p:ph type="title"/>
-          </p:nvPr>
-        </p:nvSpPr>
-        <p:spPr/>
-        <p:txBody>
-          <a:bodyPr/>
-          <a:lstStyle/>
-          <a:p>
-            <a:r>
-              <a:rPr lang="tr-TR" dirty="0"/>
-              <a:t>Makine Dili</a:t>
-            </a:r>
-          </a:p>
-        </p:txBody>
-      </p:sp>
-      <p:sp>
-        <p:nvSpPr>
-          <p:cNvPr id="3" name="Content Placeholder 2">
-            <a:extLst>
-              <a:ext uri="{FF2B5EF4-FFF2-40B4-BE49-F238E27FC236}">
-                <a16:creationId xmlns:a16="http://schemas.microsoft.com/office/drawing/2014/main" id="{1955A0C9-6458-414C-BFEE-7ED08A91BE35}"/>
-              </a:ext>
-            </a:extLst>
-          </p:cNvPr>
-          <p:cNvSpPr>
-            <a:spLocks noGrp="1"/>
-          </p:cNvSpPr>
-          <p:nvPr>
-            <p:ph idx="1"/>
-          </p:nvPr>
-        </p:nvSpPr>
-        <p:spPr/>
-        <p:txBody>
-          <a:bodyPr/>
-          <a:lstStyle/>
-          <a:p>
-            <a:r>
-              <a:rPr lang="tr-TR" dirty="0"/>
-              <a:t>Makine dili mikroişlemci ya da mikro denetleyici gibi komut işleme yeteneğine sahip entegrelerin işleyebilecekleri, yapısına göre değişebilen ama genellikle her biri 8 adet 0-1'den (bit) ibaret komutlardan oluşan dile verilen addır.</a:t>
-            </a:r>
-          </a:p>
-          <a:p>
-            <a:r>
-              <a:rPr lang="tr-TR" dirty="0"/>
-              <a:t>Her bir komutun </a:t>
-            </a:r>
-            <a:r>
-              <a:rPr lang="tr-TR" i="1" dirty="0"/>
-              <a:t>mnemonic</a:t>
-            </a:r>
-            <a:r>
-              <a:rPr lang="tr-TR" dirty="0"/>
-              <a:t> olarak adlandırılan bir tanımı ve </a:t>
-            </a:r>
-            <a:r>
-              <a:rPr lang="tr-TR" i="1" dirty="0"/>
-              <a:t>op code</a:t>
-            </a:r>
-            <a:r>
-              <a:rPr lang="tr-TR" dirty="0"/>
-              <a:t> olarak adlandırılan bir sayı karşılığı vardır. Mnemonic'ler, o op kodun ne işe yaradığını hatırda tutmaya yarar.</a:t>
-            </a:r>
-          </a:p>
-          <a:p>
-            <a:r>
-              <a:rPr lang="tr-TR" dirty="0"/>
-              <a:t>Örneğin Z-80 mikroişlemcisinde bulunan bir komutun mnemonic’i  </a:t>
-            </a:r>
-            <a:r>
-              <a:rPr lang="tr-TR" i="1" dirty="0"/>
-              <a:t>Call NN’</a:t>
-            </a:r>
-            <a:r>
-              <a:rPr lang="tr-TR" dirty="0"/>
-              <a:t>dir ve program yazarken </a:t>
-            </a:r>
-            <a:r>
-              <a:rPr lang="tr-TR" i="1" dirty="0"/>
-              <a:t>Call NN</a:t>
-            </a:r>
-            <a:r>
-              <a:rPr lang="tr-TR" dirty="0"/>
-              <a:t> mnemonic'inin op code'u olan "205" sayısı programa konur.</a:t>
-            </a:r>
-          </a:p>
-        </p:txBody>
-      </p:sp>
-      <p:sp>
-        <p:nvSpPr>
-          <p:cNvPr id="4" name="Date Placeholder 3">
-            <a:extLst>
-              <a:ext uri="{FF2B5EF4-FFF2-40B4-BE49-F238E27FC236}">
-                <a16:creationId xmlns:a16="http://schemas.microsoft.com/office/drawing/2014/main" id="{E782A061-128A-364D-A2D8-8652B72BE6CC}"/>
-              </a:ext>
-            </a:extLst>
-          </p:cNvPr>
-          <p:cNvSpPr>
-            <a:spLocks noGrp="1"/>
-          </p:cNvSpPr>
-          <p:nvPr>
-            <p:ph type="dt" sz="half" idx="10"/>
-          </p:nvPr>
-        </p:nvSpPr>
-        <p:spPr/>
-        <p:txBody>
-          <a:bodyPr/>
-          <a:lstStyle/>
-          <a:p>
-            <a:r>
-              <a:rPr lang="tr-TR"/>
-              <a:t>Medical Artificial Intelligence</a:t>
-            </a:r>
-            <a:endParaRPr lang="tr-TR" dirty="0"/>
-          </a:p>
-        </p:txBody>
-      </p:sp>
-      <p:sp>
-        <p:nvSpPr>
-          <p:cNvPr id="5" name="Slide Number Placeholder 4">
-            <a:extLst>
-              <a:ext uri="{FF2B5EF4-FFF2-40B4-BE49-F238E27FC236}">
-                <a16:creationId xmlns:a16="http://schemas.microsoft.com/office/drawing/2014/main" id="{A2A4BECE-7106-BF48-B0FC-A72EF754BFD5}"/>
-              </a:ext>
-            </a:extLst>
-          </p:cNvPr>
-          <p:cNvSpPr>
-            <a:spLocks noGrp="1"/>
-          </p:cNvSpPr>
-          <p:nvPr>
-            <p:ph type="sldNum" sz="quarter" idx="12"/>
-          </p:nvPr>
-        </p:nvSpPr>
-        <p:spPr/>
-        <p:txBody>
-          <a:bodyPr/>
-          <a:lstStyle/>
-          <a:p>
-            <a:fld id="{4119457A-5965-C148-8898-E00E7A560E34}" type="slidenum">
-              <a:rPr lang="tr-TR" smtClean="0"/>
-              <a:t>13</a:t>
-            </a:fld>
-            <a:endParaRPr lang="tr-TR" dirty="0"/>
-          </a:p>
-        </p:txBody>
-      </p:sp>
-    </p:spTree>
-    <p:extLst>
-      <p:ext uri="{BB962C8B-B14F-4D97-AF65-F5344CB8AC3E}">
-        <p14:creationId xmlns:p14="http://schemas.microsoft.com/office/powerpoint/2010/main" val="194283634"/>
-      </p:ext>
-    </p:extLst>
-  </p:cSld>
-  <p:clrMapOvr>
-    <a:masterClrMapping/>
-  </p:clrMapOvr>
-</p:sld>
-</file>
-
-<file path=ppt/slides/slide14.xml><?xml version="1.0" encoding="utf-8"?>
-<p:sld xmlns:a="http://schemas.openxmlformats.org/drawingml/2006/main" xmlns:r="http://schemas.openxmlformats.org/officeDocument/2006/relationships" xmlns:p="http://schemas.openxmlformats.org/presentationml/2006/main">
-  <p:cSld>
-    <p:spTree>
-      <p:nvGrpSpPr>
-        <p:cNvPr id="1" name=""/>
-        <p:cNvGrpSpPr/>
-        <p:nvPr/>
-      </p:nvGrpSpPr>
-      <p:grpSpPr>
-        <a:xfrm>
-          <a:off x="0" y="0"/>
-          <a:ext cx="0" cy="0"/>
-          <a:chOff x="0" y="0"/>
-          <a:chExt cx="0" cy="0"/>
-        </a:xfrm>
-      </p:grpSpPr>
-      <p:sp>
-        <p:nvSpPr>
-          <p:cNvPr id="2" name="Title 1">
-            <a:extLst>
-              <a:ext uri="{FF2B5EF4-FFF2-40B4-BE49-F238E27FC236}">
-                <a16:creationId xmlns:a16="http://schemas.microsoft.com/office/drawing/2014/main" id="{48B88005-FFCC-0245-82DB-2D1A0A55AEC9}"/>
-              </a:ext>
-            </a:extLst>
-          </p:cNvPr>
-          <p:cNvSpPr>
-            <a:spLocks noGrp="1"/>
-          </p:cNvSpPr>
-          <p:nvPr>
-            <p:ph type="title"/>
-          </p:nvPr>
-        </p:nvSpPr>
-        <p:spPr/>
-        <p:txBody>
-          <a:bodyPr/>
-          <a:lstStyle/>
-          <a:p>
-            <a:r>
-              <a:rPr lang="tr-TR" dirty="0"/>
-              <a:t>Assembly </a:t>
-            </a:r>
-          </a:p>
-        </p:txBody>
-      </p:sp>
-      <p:sp>
-        <p:nvSpPr>
-          <p:cNvPr id="3" name="Content Placeholder 2">
-            <a:extLst>
-              <a:ext uri="{FF2B5EF4-FFF2-40B4-BE49-F238E27FC236}">
-                <a16:creationId xmlns:a16="http://schemas.microsoft.com/office/drawing/2014/main" id="{4373DC56-E18B-E94E-80AD-6F6310AEB2FB}"/>
-              </a:ext>
-            </a:extLst>
-          </p:cNvPr>
-          <p:cNvSpPr>
-            <a:spLocks noGrp="1"/>
-          </p:cNvSpPr>
-          <p:nvPr>
-            <p:ph idx="1"/>
-          </p:nvPr>
-        </p:nvSpPr>
-        <p:spPr/>
-        <p:txBody>
-          <a:bodyPr/>
-          <a:lstStyle/>
-          <a:p>
-            <a:r>
-              <a:rPr lang="tr-TR" dirty="0"/>
-              <a:t>Makine dilini öğrenmek ve kullanmak zordur. Bu nedenle insanların anlayabileceğimiz bir dilde konuşup ardından işlemcinin diline çeviren yazılımlar geliştirilmiştir. Bunlara </a:t>
-            </a:r>
-            <a:r>
-              <a:rPr lang="tr-TR" b="1" dirty="0"/>
-              <a:t>derleyici</a:t>
-            </a:r>
-            <a:r>
-              <a:rPr lang="tr-TR" dirty="0"/>
-              <a:t> denir. Derleyiciler de bir dile sahiptir fakat işlemcinin diline göre çok daha kolaydır. İşte bu derleyici dillerinden biri de </a:t>
-            </a:r>
-            <a:r>
-              <a:rPr lang="tr-TR" b="1" dirty="0"/>
-              <a:t>Assembly'</a:t>
-            </a:r>
-            <a:r>
-              <a:rPr lang="tr-TR" dirty="0"/>
-              <a:t>dir. Çevirici dil, bilgisayar programlarının yazılmasında kullanılan alt seviyeli bir dildir.</a:t>
-            </a:r>
-          </a:p>
-        </p:txBody>
-      </p:sp>
-      <p:sp>
-        <p:nvSpPr>
-          <p:cNvPr id="4" name="Date Placeholder 3">
-            <a:extLst>
-              <a:ext uri="{FF2B5EF4-FFF2-40B4-BE49-F238E27FC236}">
-                <a16:creationId xmlns:a16="http://schemas.microsoft.com/office/drawing/2014/main" id="{5A9AE38F-A9CC-6F4A-963E-D42F0294645F}"/>
-              </a:ext>
-            </a:extLst>
-          </p:cNvPr>
-          <p:cNvSpPr>
-            <a:spLocks noGrp="1"/>
-          </p:cNvSpPr>
-          <p:nvPr>
-            <p:ph type="dt" sz="half" idx="10"/>
-          </p:nvPr>
-        </p:nvSpPr>
-        <p:spPr/>
-        <p:txBody>
-          <a:bodyPr/>
-          <a:lstStyle/>
-          <a:p>
-            <a:r>
-              <a:rPr lang="tr-TR"/>
-              <a:t>Medical Artificial Intelligence</a:t>
-            </a:r>
-            <a:endParaRPr lang="tr-TR" dirty="0"/>
-          </a:p>
-        </p:txBody>
-      </p:sp>
-      <p:sp>
-        <p:nvSpPr>
-          <p:cNvPr id="5" name="Slide Number Placeholder 4">
-            <a:extLst>
-              <a:ext uri="{FF2B5EF4-FFF2-40B4-BE49-F238E27FC236}">
-                <a16:creationId xmlns:a16="http://schemas.microsoft.com/office/drawing/2014/main" id="{CCA0639A-2E7F-6242-88D2-CB250359F1A1}"/>
-              </a:ext>
-            </a:extLst>
-          </p:cNvPr>
-          <p:cNvSpPr>
-            <a:spLocks noGrp="1"/>
-          </p:cNvSpPr>
-          <p:nvPr>
-            <p:ph type="sldNum" sz="quarter" idx="12"/>
-          </p:nvPr>
-        </p:nvSpPr>
-        <p:spPr/>
-        <p:txBody>
-          <a:bodyPr/>
-          <a:lstStyle/>
-          <a:p>
-            <a:fld id="{4119457A-5965-C148-8898-E00E7A560E34}" type="slidenum">
-              <a:rPr lang="tr-TR" smtClean="0"/>
-              <a:t>14</a:t>
-            </a:fld>
-            <a:endParaRPr lang="tr-TR" dirty="0"/>
-          </a:p>
-        </p:txBody>
-      </p:sp>
-    </p:spTree>
-    <p:extLst>
-      <p:ext uri="{BB962C8B-B14F-4D97-AF65-F5344CB8AC3E}">
-        <p14:creationId xmlns:p14="http://schemas.microsoft.com/office/powerpoint/2010/main" val="1024684645"/>
-      </p:ext>
-    </p:extLst>
-  </p:cSld>
-  <p:clrMapOvr>
-    <a:masterClrMapping/>
-  </p:clrMapOvr>
-</p:sld>
-</file>
-
 <file path=ppt/slides/slide15.xml><?xml version="1.0" encoding="utf-8"?>
 <p:sld xmlns:a="http://schemas.openxmlformats.org/drawingml/2006/main" xmlns:r="http://schemas.openxmlformats.org/officeDocument/2006/relationships" xmlns:p="http://schemas.openxmlformats.org/presentationml/2006/main">
   <p:cSld>
@@ -7371,7 +7712,7 @@
           <p:cNvPr id="2" name="Title 1">
             <a:extLst>
               <a:ext uri="{FF2B5EF4-FFF2-40B4-BE49-F238E27FC236}">
-                <a16:creationId xmlns:a16="http://schemas.microsoft.com/office/drawing/2014/main" id="{B9137A2E-F4ED-0642-891E-FD5E24589E1D}"/>
+                <a16:creationId xmlns:a16="http://schemas.microsoft.com/office/drawing/2014/main" id="{042929B4-0CFC-1146-8BBD-A9BE4EACE90D}"/>
               </a:ext>
             </a:extLst>
           </p:cNvPr>
@@ -7389,7 +7730,79 @@
           <a:p>
             <a:r>
               <a:rPr lang="tr-TR" dirty="0"/>
-              <a:t>Assembly ve Makine Dili</a:t>
+              <a:t>Makine Dili</a:t>
+            </a:r>
+          </a:p>
+        </p:txBody>
+      </p:sp>
+      <p:sp>
+        <p:nvSpPr>
+          <p:cNvPr id="3" name="Content Placeholder 2">
+            <a:extLst>
+              <a:ext uri="{FF2B5EF4-FFF2-40B4-BE49-F238E27FC236}">
+                <a16:creationId xmlns:a16="http://schemas.microsoft.com/office/drawing/2014/main" id="{1955A0C9-6458-414C-BFEE-7ED08A91BE35}"/>
+              </a:ext>
+            </a:extLst>
+          </p:cNvPr>
+          <p:cNvSpPr>
+            <a:spLocks noGrp="1"/>
+          </p:cNvSpPr>
+          <p:nvPr>
+            <p:ph idx="1"/>
+          </p:nvPr>
+        </p:nvSpPr>
+        <p:spPr/>
+        <p:txBody>
+          <a:bodyPr/>
+          <a:lstStyle/>
+          <a:p>
+            <a:r>
+              <a:rPr lang="tr-TR" dirty="0"/>
+              <a:t>Makine dili mikroişlemci ya da mikro denetleyici gibi komut işleme yeteneğine sahip entegrelerin işleyebilecekleri, yapısına göre değişebilen ama genellikle her biri 8 adet 0-1'den (bit) ibaret komutlardan oluşan dile verilen addır.</a:t>
+            </a:r>
+          </a:p>
+          <a:p>
+            <a:r>
+              <a:rPr lang="tr-TR" dirty="0"/>
+              <a:t>Her bir komutun </a:t>
+            </a:r>
+            <a:r>
+              <a:rPr lang="tr-TR" i="1" dirty="0"/>
+              <a:t>mnemonic</a:t>
+            </a:r>
+            <a:r>
+              <a:rPr lang="tr-TR" dirty="0"/>
+              <a:t> olarak adlandırılan bir tanımı ve </a:t>
+            </a:r>
+            <a:r>
+              <a:rPr lang="tr-TR" i="1" dirty="0"/>
+              <a:t>op code</a:t>
+            </a:r>
+            <a:r>
+              <a:rPr lang="tr-TR" dirty="0"/>
+              <a:t> olarak adlandırılan bir sayı karşılığı vardır. Mnemonic'ler, o op kodun ne işe yaradığını hatırda tutmaya yarar.</a:t>
+            </a:r>
+          </a:p>
+          <a:p>
+            <a:r>
+              <a:rPr lang="tr-TR" dirty="0"/>
+              <a:t>Örneğin Z-80 mikroişlemcisinde bulunan bir komutun mnemonic’i  </a:t>
+            </a:r>
+            <a:r>
+              <a:rPr lang="tr-TR" i="1" dirty="0"/>
+              <a:t>Call NN’</a:t>
+            </a:r>
+            <a:r>
+              <a:rPr lang="tr-TR" dirty="0"/>
+              <a:t>dir ve program yazarken </a:t>
+            </a:r>
+            <a:r>
+              <a:rPr lang="tr-TR" i="1" dirty="0"/>
+              <a:t>Call NN</a:t>
+            </a:r>
+            <a:r>
+              <a:rPr lang="tr-TR" dirty="0"/>
+              <a:t> mnemonic'inin op code'u olan "205" sayısı programa konur.</a:t>
             </a:r>
           </a:p>
         </p:txBody>
@@ -7399,7 +7812,7 @@
           <p:cNvPr id="4" name="Date Placeholder 3">
             <a:extLst>
               <a:ext uri="{FF2B5EF4-FFF2-40B4-BE49-F238E27FC236}">
-                <a16:creationId xmlns:a16="http://schemas.microsoft.com/office/drawing/2014/main" id="{A1033918-92DC-AB4D-9938-6B5856AD4381}"/>
+                <a16:creationId xmlns:a16="http://schemas.microsoft.com/office/drawing/2014/main" id="{E782A061-128A-364D-A2D8-8652B72BE6CC}"/>
               </a:ext>
             </a:extLst>
           </p:cNvPr>
@@ -7428,7 +7841,7 @@
           <p:cNvPr id="5" name="Slide Number Placeholder 4">
             <a:extLst>
               <a:ext uri="{FF2B5EF4-FFF2-40B4-BE49-F238E27FC236}">
-                <a16:creationId xmlns:a16="http://schemas.microsoft.com/office/drawing/2014/main" id="{E51C2469-92A2-3844-9BBA-00A21CB64815}"/>
+                <a16:creationId xmlns:a16="http://schemas.microsoft.com/office/drawing/2014/main" id="{A2A4BECE-7106-BF48-B0FC-A72EF754BFD5}"/>
               </a:ext>
             </a:extLst>
           </p:cNvPr>
@@ -7447,6 +7860,282 @@
             <a:fld id="{4119457A-5965-C148-8898-E00E7A560E34}" type="slidenum">
               <a:rPr lang="tr-TR" smtClean="0"/>
               <a:t>15</a:t>
+            </a:fld>
+            <a:endParaRPr lang="tr-TR" dirty="0"/>
+          </a:p>
+        </p:txBody>
+      </p:sp>
+    </p:spTree>
+    <p:extLst>
+      <p:ext uri="{BB962C8B-B14F-4D97-AF65-F5344CB8AC3E}">
+        <p14:creationId xmlns:p14="http://schemas.microsoft.com/office/powerpoint/2010/main" val="194283634"/>
+      </p:ext>
+    </p:extLst>
+  </p:cSld>
+  <p:clrMapOvr>
+    <a:masterClrMapping/>
+  </p:clrMapOvr>
+</p:sld>
+</file>
+
+<file path=ppt/slides/slide16.xml><?xml version="1.0" encoding="utf-8"?>
+<p:sld xmlns:a="http://schemas.openxmlformats.org/drawingml/2006/main" xmlns:r="http://schemas.openxmlformats.org/officeDocument/2006/relationships" xmlns:p="http://schemas.openxmlformats.org/presentationml/2006/main">
+  <p:cSld>
+    <p:spTree>
+      <p:nvGrpSpPr>
+        <p:cNvPr id="1" name=""/>
+        <p:cNvGrpSpPr/>
+        <p:nvPr/>
+      </p:nvGrpSpPr>
+      <p:grpSpPr>
+        <a:xfrm>
+          <a:off x="0" y="0"/>
+          <a:ext cx="0" cy="0"/>
+          <a:chOff x="0" y="0"/>
+          <a:chExt cx="0" cy="0"/>
+        </a:xfrm>
+      </p:grpSpPr>
+      <p:sp>
+        <p:nvSpPr>
+          <p:cNvPr id="2" name="Title 1">
+            <a:extLst>
+              <a:ext uri="{FF2B5EF4-FFF2-40B4-BE49-F238E27FC236}">
+                <a16:creationId xmlns:a16="http://schemas.microsoft.com/office/drawing/2014/main" id="{48B88005-FFCC-0245-82DB-2D1A0A55AEC9}"/>
+              </a:ext>
+            </a:extLst>
+          </p:cNvPr>
+          <p:cNvSpPr>
+            <a:spLocks noGrp="1"/>
+          </p:cNvSpPr>
+          <p:nvPr>
+            <p:ph type="title"/>
+          </p:nvPr>
+        </p:nvSpPr>
+        <p:spPr/>
+        <p:txBody>
+          <a:bodyPr/>
+          <a:lstStyle/>
+          <a:p>
+            <a:r>
+              <a:rPr lang="tr-TR" dirty="0"/>
+              <a:t>Assembly </a:t>
+            </a:r>
+          </a:p>
+        </p:txBody>
+      </p:sp>
+      <p:sp>
+        <p:nvSpPr>
+          <p:cNvPr id="3" name="Content Placeholder 2">
+            <a:extLst>
+              <a:ext uri="{FF2B5EF4-FFF2-40B4-BE49-F238E27FC236}">
+                <a16:creationId xmlns:a16="http://schemas.microsoft.com/office/drawing/2014/main" id="{4373DC56-E18B-E94E-80AD-6F6310AEB2FB}"/>
+              </a:ext>
+            </a:extLst>
+          </p:cNvPr>
+          <p:cNvSpPr>
+            <a:spLocks noGrp="1"/>
+          </p:cNvSpPr>
+          <p:nvPr>
+            <p:ph idx="1"/>
+          </p:nvPr>
+        </p:nvSpPr>
+        <p:spPr/>
+        <p:txBody>
+          <a:bodyPr/>
+          <a:lstStyle/>
+          <a:p>
+            <a:r>
+              <a:rPr lang="tr-TR" dirty="0"/>
+              <a:t>Makine dilini öğrenmek ve kullanmak zordur. Bu nedenle insanların anlayabileceğimiz bir dilde konuşup ardından işlemcinin diline çeviren yazılımlar geliştirilmiştir. Bunlara </a:t>
+            </a:r>
+            <a:r>
+              <a:rPr lang="tr-TR" b="1" dirty="0"/>
+              <a:t>derleyici</a:t>
+            </a:r>
+            <a:r>
+              <a:rPr lang="tr-TR" dirty="0"/>
+              <a:t> denir. Derleyiciler de bir dile sahiptir fakat işlemcinin diline göre çok daha kolaydır. İşte bu derleyici dillerinden biri de </a:t>
+            </a:r>
+            <a:r>
+              <a:rPr lang="tr-TR" b="1" dirty="0"/>
+              <a:t>Assembly'</a:t>
+            </a:r>
+            <a:r>
+              <a:rPr lang="tr-TR" dirty="0"/>
+              <a:t>dir. Çevirici dil, bilgisayar programlarının yazılmasında kullanılan alt seviyeli bir dildir.</a:t>
+            </a:r>
+          </a:p>
+        </p:txBody>
+      </p:sp>
+      <p:sp>
+        <p:nvSpPr>
+          <p:cNvPr id="4" name="Date Placeholder 3">
+            <a:extLst>
+              <a:ext uri="{FF2B5EF4-FFF2-40B4-BE49-F238E27FC236}">
+                <a16:creationId xmlns:a16="http://schemas.microsoft.com/office/drawing/2014/main" id="{5A9AE38F-A9CC-6F4A-963E-D42F0294645F}"/>
+              </a:ext>
+            </a:extLst>
+          </p:cNvPr>
+          <p:cNvSpPr>
+            <a:spLocks noGrp="1"/>
+          </p:cNvSpPr>
+          <p:nvPr>
+            <p:ph type="dt" sz="half" idx="10"/>
+          </p:nvPr>
+        </p:nvSpPr>
+        <p:spPr/>
+        <p:txBody>
+          <a:bodyPr/>
+          <a:lstStyle/>
+          <a:p>
+            <a:r>
+              <a:rPr lang="tr-TR"/>
+              <a:t>Medical Artificial Intelligence</a:t>
+            </a:r>
+            <a:endParaRPr lang="tr-TR" dirty="0"/>
+          </a:p>
+        </p:txBody>
+      </p:sp>
+      <p:sp>
+        <p:nvSpPr>
+          <p:cNvPr id="5" name="Slide Number Placeholder 4">
+            <a:extLst>
+              <a:ext uri="{FF2B5EF4-FFF2-40B4-BE49-F238E27FC236}">
+                <a16:creationId xmlns:a16="http://schemas.microsoft.com/office/drawing/2014/main" id="{CCA0639A-2E7F-6242-88D2-CB250359F1A1}"/>
+              </a:ext>
+            </a:extLst>
+          </p:cNvPr>
+          <p:cNvSpPr>
+            <a:spLocks noGrp="1"/>
+          </p:cNvSpPr>
+          <p:nvPr>
+            <p:ph type="sldNum" sz="quarter" idx="12"/>
+          </p:nvPr>
+        </p:nvSpPr>
+        <p:spPr/>
+        <p:txBody>
+          <a:bodyPr/>
+          <a:lstStyle/>
+          <a:p>
+            <a:fld id="{4119457A-5965-C148-8898-E00E7A560E34}" type="slidenum">
+              <a:rPr lang="tr-TR" smtClean="0"/>
+              <a:t>16</a:t>
+            </a:fld>
+            <a:endParaRPr lang="tr-TR" dirty="0"/>
+          </a:p>
+        </p:txBody>
+      </p:sp>
+    </p:spTree>
+    <p:extLst>
+      <p:ext uri="{BB962C8B-B14F-4D97-AF65-F5344CB8AC3E}">
+        <p14:creationId xmlns:p14="http://schemas.microsoft.com/office/powerpoint/2010/main" val="1024684645"/>
+      </p:ext>
+    </p:extLst>
+  </p:cSld>
+  <p:clrMapOvr>
+    <a:masterClrMapping/>
+  </p:clrMapOvr>
+</p:sld>
+</file>
+
+<file path=ppt/slides/slide17.xml><?xml version="1.0" encoding="utf-8"?>
+<p:sld xmlns:a="http://schemas.openxmlformats.org/drawingml/2006/main" xmlns:r="http://schemas.openxmlformats.org/officeDocument/2006/relationships" xmlns:p="http://schemas.openxmlformats.org/presentationml/2006/main">
+  <p:cSld>
+    <p:spTree>
+      <p:nvGrpSpPr>
+        <p:cNvPr id="1" name=""/>
+        <p:cNvGrpSpPr/>
+        <p:nvPr/>
+      </p:nvGrpSpPr>
+      <p:grpSpPr>
+        <a:xfrm>
+          <a:off x="0" y="0"/>
+          <a:ext cx="0" cy="0"/>
+          <a:chOff x="0" y="0"/>
+          <a:chExt cx="0" cy="0"/>
+        </a:xfrm>
+      </p:grpSpPr>
+      <p:sp>
+        <p:nvSpPr>
+          <p:cNvPr id="2" name="Title 1">
+            <a:extLst>
+              <a:ext uri="{FF2B5EF4-FFF2-40B4-BE49-F238E27FC236}">
+                <a16:creationId xmlns:a16="http://schemas.microsoft.com/office/drawing/2014/main" id="{B9137A2E-F4ED-0642-891E-FD5E24589E1D}"/>
+              </a:ext>
+            </a:extLst>
+          </p:cNvPr>
+          <p:cNvSpPr>
+            <a:spLocks noGrp="1"/>
+          </p:cNvSpPr>
+          <p:nvPr>
+            <p:ph type="title"/>
+          </p:nvPr>
+        </p:nvSpPr>
+        <p:spPr/>
+        <p:txBody>
+          <a:bodyPr/>
+          <a:lstStyle/>
+          <a:p>
+            <a:r>
+              <a:rPr lang="tr-TR" dirty="0"/>
+              <a:t>Assembly ve Makine Dili</a:t>
+            </a:r>
+          </a:p>
+        </p:txBody>
+      </p:sp>
+      <p:sp>
+        <p:nvSpPr>
+          <p:cNvPr id="4" name="Date Placeholder 3">
+            <a:extLst>
+              <a:ext uri="{FF2B5EF4-FFF2-40B4-BE49-F238E27FC236}">
+                <a16:creationId xmlns:a16="http://schemas.microsoft.com/office/drawing/2014/main" id="{A1033918-92DC-AB4D-9938-6B5856AD4381}"/>
+              </a:ext>
+            </a:extLst>
+          </p:cNvPr>
+          <p:cNvSpPr>
+            <a:spLocks noGrp="1"/>
+          </p:cNvSpPr>
+          <p:nvPr>
+            <p:ph type="dt" sz="half" idx="10"/>
+          </p:nvPr>
+        </p:nvSpPr>
+        <p:spPr/>
+        <p:txBody>
+          <a:bodyPr/>
+          <a:lstStyle/>
+          <a:p>
+            <a:r>
+              <a:rPr lang="tr-TR"/>
+              <a:t>Medical Artificial Intelligence</a:t>
+            </a:r>
+            <a:endParaRPr lang="tr-TR" dirty="0"/>
+          </a:p>
+        </p:txBody>
+      </p:sp>
+      <p:sp>
+        <p:nvSpPr>
+          <p:cNvPr id="5" name="Slide Number Placeholder 4">
+            <a:extLst>
+              <a:ext uri="{FF2B5EF4-FFF2-40B4-BE49-F238E27FC236}">
+                <a16:creationId xmlns:a16="http://schemas.microsoft.com/office/drawing/2014/main" id="{E51C2469-92A2-3844-9BBA-00A21CB64815}"/>
+              </a:ext>
+            </a:extLst>
+          </p:cNvPr>
+          <p:cNvSpPr>
+            <a:spLocks noGrp="1"/>
+          </p:cNvSpPr>
+          <p:nvPr>
+            <p:ph type="sldNum" sz="quarter" idx="12"/>
+          </p:nvPr>
+        </p:nvSpPr>
+        <p:spPr/>
+        <p:txBody>
+          <a:bodyPr/>
+          <a:lstStyle/>
+          <a:p>
+            <a:fld id="{4119457A-5965-C148-8898-E00E7A560E34}" type="slidenum">
+              <a:rPr lang="tr-TR" smtClean="0"/>
+              <a:t>17</a:t>
             </a:fld>
             <a:endParaRPr lang="tr-TR" dirty="0"/>
           </a:p>
@@ -7495,388 +8184,6 @@
 </p:sld>
 </file>
 
-<file path=ppt/slides/slide16.xml><?xml version="1.0" encoding="utf-8"?>
-<p:sld xmlns:a="http://schemas.openxmlformats.org/drawingml/2006/main" xmlns:r="http://schemas.openxmlformats.org/officeDocument/2006/relationships" xmlns:p="http://schemas.openxmlformats.org/presentationml/2006/main">
-  <p:cSld>
-    <p:spTree>
-      <p:nvGrpSpPr>
-        <p:cNvPr id="1" name=""/>
-        <p:cNvGrpSpPr/>
-        <p:nvPr/>
-      </p:nvGrpSpPr>
-      <p:grpSpPr>
-        <a:xfrm>
-          <a:off x="0" y="0"/>
-          <a:ext cx="0" cy="0"/>
-          <a:chOff x="0" y="0"/>
-          <a:chExt cx="0" cy="0"/>
-        </a:xfrm>
-      </p:grpSpPr>
-      <p:sp>
-        <p:nvSpPr>
-          <p:cNvPr id="2" name="Title 1">
-            <a:extLst>
-              <a:ext uri="{FF2B5EF4-FFF2-40B4-BE49-F238E27FC236}">
-                <a16:creationId xmlns:a16="http://schemas.microsoft.com/office/drawing/2014/main" id="{91323331-E0E8-2D4A-995E-9C2E696E93E7}"/>
-              </a:ext>
-            </a:extLst>
-          </p:cNvPr>
-          <p:cNvSpPr>
-            <a:spLocks noGrp="1"/>
-          </p:cNvSpPr>
-          <p:nvPr>
-            <p:ph type="title"/>
-          </p:nvPr>
-        </p:nvSpPr>
-        <p:spPr>
-          <a:xfrm>
-            <a:off x="838200" y="365125"/>
-            <a:ext cx="11542986" cy="1325563"/>
-          </a:xfrm>
-        </p:spPr>
-        <p:txBody>
-          <a:bodyPr>
-            <a:normAutofit/>
-          </a:bodyPr>
-          <a:lstStyle/>
-          <a:p>
-            <a:r>
-              <a:rPr lang="tr-TR" dirty="0"/>
-              <a:t>Derleyici(Compiler) ve Yorumlayıcı(Interpreter)</a:t>
-            </a:r>
-          </a:p>
-        </p:txBody>
-      </p:sp>
-      <p:sp>
-        <p:nvSpPr>
-          <p:cNvPr id="3" name="Content Placeholder 2">
-            <a:extLst>
-              <a:ext uri="{FF2B5EF4-FFF2-40B4-BE49-F238E27FC236}">
-                <a16:creationId xmlns:a16="http://schemas.microsoft.com/office/drawing/2014/main" id="{E6CCB8F0-F21A-4F48-AE13-2DC194106EEB}"/>
-              </a:ext>
-            </a:extLst>
-          </p:cNvPr>
-          <p:cNvSpPr>
-            <a:spLocks noGrp="1"/>
-          </p:cNvSpPr>
-          <p:nvPr>
-            <p:ph idx="1"/>
-          </p:nvPr>
-        </p:nvSpPr>
-        <p:spPr/>
-        <p:txBody>
-          <a:bodyPr/>
-          <a:lstStyle/>
-          <a:p>
-            <a:r>
-              <a:rPr lang="tr-TR" dirty="0"/>
-              <a:t>Bahsettiğim üzere derlenen diller çalıştırılmadan önce makine diline derleyiciler tarafından tercüme edilmesi gerekir.</a:t>
-            </a:r>
-          </a:p>
-          <a:p>
-            <a:pPr marL="0" indent="0">
-              <a:buNone/>
-            </a:pPr>
-            <a:endParaRPr lang="tr-TR" dirty="0"/>
-          </a:p>
-          <a:p>
-            <a:r>
-              <a:rPr lang="tr-TR" dirty="0"/>
-              <a:t>Yorumlayıcı, kaynak kodu komut komut okuyup üzerinde çalışılan makinenin komut setine çevirerek çalıştıran bir programdır. Yorumlanarak çalıştırılan yüksek seviyeli diller doğrudan yorumlanmazlar. Genellikle bir ara forma(</a:t>
-            </a:r>
-            <a:r>
-              <a:rPr lang="tr-TR" dirty="0" err="1"/>
-              <a:t>Opcode</a:t>
-            </a:r>
-            <a:r>
-              <a:rPr lang="tr-TR" dirty="0"/>
-              <a:t>, </a:t>
-            </a:r>
-            <a:r>
-              <a:rPr lang="tr-TR" dirty="0" err="1"/>
-              <a:t>Bytecode</a:t>
-            </a:r>
-            <a:r>
-              <a:rPr lang="tr-TR" dirty="0"/>
-              <a:t> vs.) derlenir ve bu kodlar yorumlanarak yerel makine diline çevrilir ve işletilir. Python gibi yorumlanan diller aslında yorumlama aşamasına geçilmeden önce en az 1 kere derlenirler.</a:t>
-            </a:r>
-          </a:p>
-        </p:txBody>
-      </p:sp>
-      <p:sp>
-        <p:nvSpPr>
-          <p:cNvPr id="4" name="Date Placeholder 3">
-            <a:extLst>
-              <a:ext uri="{FF2B5EF4-FFF2-40B4-BE49-F238E27FC236}">
-                <a16:creationId xmlns:a16="http://schemas.microsoft.com/office/drawing/2014/main" id="{E82D68ED-B44D-F44A-9D02-810B047D4D3B}"/>
-              </a:ext>
-            </a:extLst>
-          </p:cNvPr>
-          <p:cNvSpPr>
-            <a:spLocks noGrp="1"/>
-          </p:cNvSpPr>
-          <p:nvPr>
-            <p:ph type="dt" sz="half" idx="10"/>
-          </p:nvPr>
-        </p:nvSpPr>
-        <p:spPr/>
-        <p:txBody>
-          <a:bodyPr/>
-          <a:lstStyle/>
-          <a:p>
-            <a:r>
-              <a:rPr lang="tr-TR"/>
-              <a:t>Medical Artificial Intelligence</a:t>
-            </a:r>
-            <a:endParaRPr lang="tr-TR" dirty="0"/>
-          </a:p>
-        </p:txBody>
-      </p:sp>
-      <p:sp>
-        <p:nvSpPr>
-          <p:cNvPr id="5" name="Slide Number Placeholder 4">
-            <a:extLst>
-              <a:ext uri="{FF2B5EF4-FFF2-40B4-BE49-F238E27FC236}">
-                <a16:creationId xmlns:a16="http://schemas.microsoft.com/office/drawing/2014/main" id="{2A7DA56E-4868-3149-9A96-60659332E995}"/>
-              </a:ext>
-            </a:extLst>
-          </p:cNvPr>
-          <p:cNvSpPr>
-            <a:spLocks noGrp="1"/>
-          </p:cNvSpPr>
-          <p:nvPr>
-            <p:ph type="sldNum" sz="quarter" idx="12"/>
-          </p:nvPr>
-        </p:nvSpPr>
-        <p:spPr/>
-        <p:txBody>
-          <a:bodyPr/>
-          <a:lstStyle/>
-          <a:p>
-            <a:fld id="{4119457A-5965-C148-8898-E00E7A560E34}" type="slidenum">
-              <a:rPr lang="tr-TR" smtClean="0"/>
-              <a:t>16</a:t>
-            </a:fld>
-            <a:endParaRPr lang="tr-TR" dirty="0"/>
-          </a:p>
-        </p:txBody>
-      </p:sp>
-    </p:spTree>
-    <p:extLst>
-      <p:ext uri="{BB962C8B-B14F-4D97-AF65-F5344CB8AC3E}">
-        <p14:creationId xmlns:p14="http://schemas.microsoft.com/office/powerpoint/2010/main" val="4164482068"/>
-      </p:ext>
-    </p:extLst>
-  </p:cSld>
-  <p:clrMapOvr>
-    <a:masterClrMapping/>
-  </p:clrMapOvr>
-</p:sld>
-</file>
-
-<file path=ppt/slides/slide17.xml><?xml version="1.0" encoding="utf-8"?>
-<p:sld xmlns:a="http://schemas.openxmlformats.org/drawingml/2006/main" xmlns:r="http://schemas.openxmlformats.org/officeDocument/2006/relationships" xmlns:p="http://schemas.openxmlformats.org/presentationml/2006/main">
-  <p:cSld>
-    <p:spTree>
-      <p:nvGrpSpPr>
-        <p:cNvPr id="1" name=""/>
-        <p:cNvGrpSpPr/>
-        <p:nvPr/>
-      </p:nvGrpSpPr>
-      <p:grpSpPr>
-        <a:xfrm>
-          <a:off x="0" y="0"/>
-          <a:ext cx="0" cy="0"/>
-          <a:chOff x="0" y="0"/>
-          <a:chExt cx="0" cy="0"/>
-        </a:xfrm>
-      </p:grpSpPr>
-      <p:sp>
-        <p:nvSpPr>
-          <p:cNvPr id="2" name="Title 1">
-            <a:extLst>
-              <a:ext uri="{FF2B5EF4-FFF2-40B4-BE49-F238E27FC236}">
-                <a16:creationId xmlns:a16="http://schemas.microsoft.com/office/drawing/2014/main" id="{D57B2DFC-522F-0642-9E9C-9B4DD63DD34D}"/>
-              </a:ext>
-            </a:extLst>
-          </p:cNvPr>
-          <p:cNvSpPr>
-            <a:spLocks noGrp="1"/>
-          </p:cNvSpPr>
-          <p:nvPr>
-            <p:ph type="title"/>
-          </p:nvPr>
-        </p:nvSpPr>
-        <p:spPr/>
-        <p:txBody>
-          <a:bodyPr/>
-          <a:lstStyle/>
-          <a:p>
-            <a:pPr algn="ctr"/>
-            <a:r>
-              <a:rPr lang="tr-TR" dirty="0"/>
-              <a:t>Python</a:t>
-            </a:r>
-          </a:p>
-        </p:txBody>
-      </p:sp>
-      <p:sp>
-        <p:nvSpPr>
-          <p:cNvPr id="3" name="Content Placeholder 2">
-            <a:extLst>
-              <a:ext uri="{FF2B5EF4-FFF2-40B4-BE49-F238E27FC236}">
-                <a16:creationId xmlns:a16="http://schemas.microsoft.com/office/drawing/2014/main" id="{5680630C-BCFD-2141-A0DC-68104FAFD453}"/>
-              </a:ext>
-            </a:extLst>
-          </p:cNvPr>
-          <p:cNvSpPr>
-            <a:spLocks noGrp="1"/>
-          </p:cNvSpPr>
-          <p:nvPr>
-            <p:ph idx="1"/>
-          </p:nvPr>
-        </p:nvSpPr>
-        <p:spPr/>
-        <p:txBody>
-          <a:bodyPr>
-            <a:normAutofit/>
-          </a:bodyPr>
-          <a:lstStyle/>
-          <a:p>
-            <a:r>
-              <a:rPr lang="tr-TR" dirty="0"/>
-              <a:t>Python, yorumlanmış, nesne yönelimli, üst düzey bir programlama dilidir.</a:t>
-            </a:r>
-          </a:p>
-          <a:p>
-            <a:pPr marL="0" indent="0">
-              <a:buNone/>
-            </a:pPr>
-            <a:endParaRPr lang="tr-TR" dirty="0"/>
-          </a:p>
-          <a:p>
-            <a:r>
-              <a:rPr lang="tr-TR" dirty="0"/>
-              <a:t>1990'ların başında, </a:t>
-            </a:r>
-            <a:r>
-              <a:rPr lang="tr-TR" dirty="0" err="1"/>
-              <a:t>Guido</a:t>
-            </a:r>
-            <a:r>
-              <a:rPr lang="tr-TR" dirty="0"/>
-              <a:t> </a:t>
-            </a:r>
-            <a:r>
-              <a:rPr lang="tr-TR" dirty="0" err="1"/>
-              <a:t>van</a:t>
-            </a:r>
-            <a:r>
-              <a:rPr lang="tr-TR" dirty="0"/>
-              <a:t> </a:t>
-            </a:r>
-            <a:r>
-              <a:rPr lang="tr-TR" dirty="0" err="1"/>
-              <a:t>Rossum</a:t>
-            </a:r>
-            <a:r>
-              <a:rPr lang="tr-TR" dirty="0"/>
-              <a:t>, programlama dili olacak </a:t>
-            </a:r>
-            <a:r>
-              <a:rPr lang="tr-TR" dirty="0" err="1"/>
-              <a:t>Python’ı</a:t>
-            </a:r>
-            <a:r>
-              <a:rPr lang="tr-TR" dirty="0"/>
-              <a:t> tasarladı.</a:t>
-            </a:r>
-          </a:p>
-          <a:p>
-            <a:pPr marL="0" indent="0">
-              <a:buNone/>
-            </a:pPr>
-            <a:endParaRPr lang="tr-TR" dirty="0"/>
-          </a:p>
-          <a:p>
-            <a:r>
-              <a:rPr lang="tr-TR" dirty="0"/>
-              <a:t>Python programları Python yorumlayıcısı tarafından yürütülür. </a:t>
-            </a:r>
-          </a:p>
-        </p:txBody>
-      </p:sp>
-      <p:sp>
-        <p:nvSpPr>
-          <p:cNvPr id="4" name="Date Placeholder 3">
-            <a:extLst>
-              <a:ext uri="{FF2B5EF4-FFF2-40B4-BE49-F238E27FC236}">
-                <a16:creationId xmlns:a16="http://schemas.microsoft.com/office/drawing/2014/main" id="{3E6C67C0-CD10-674E-9C82-B15FFA0F5E3D}"/>
-              </a:ext>
-            </a:extLst>
-          </p:cNvPr>
-          <p:cNvSpPr>
-            <a:spLocks noGrp="1"/>
-          </p:cNvSpPr>
-          <p:nvPr>
-            <p:ph type="dt" sz="half" idx="10"/>
-          </p:nvPr>
-        </p:nvSpPr>
-        <p:spPr/>
-        <p:txBody>
-          <a:bodyPr/>
-          <a:lstStyle/>
-          <a:p>
-            <a:r>
-              <a:rPr lang="tr-TR"/>
-              <a:t>Medical Artificial Intelligence</a:t>
-            </a:r>
-            <a:endParaRPr lang="tr-TR" dirty="0"/>
-          </a:p>
-        </p:txBody>
-      </p:sp>
-      <p:sp>
-        <p:nvSpPr>
-          <p:cNvPr id="5" name="Slide Number Placeholder 4">
-            <a:extLst>
-              <a:ext uri="{FF2B5EF4-FFF2-40B4-BE49-F238E27FC236}">
-                <a16:creationId xmlns:a16="http://schemas.microsoft.com/office/drawing/2014/main" id="{842DCBCE-FA5D-5140-95EB-802E7D5E8A8B}"/>
-              </a:ext>
-            </a:extLst>
-          </p:cNvPr>
-          <p:cNvSpPr>
-            <a:spLocks noGrp="1"/>
-          </p:cNvSpPr>
-          <p:nvPr>
-            <p:ph type="sldNum" sz="quarter" idx="12"/>
-          </p:nvPr>
-        </p:nvSpPr>
-        <p:spPr/>
-        <p:txBody>
-          <a:bodyPr/>
-          <a:lstStyle/>
-          <a:p>
-            <a:fld id="{4119457A-5965-C148-8898-E00E7A560E34}" type="slidenum">
-              <a:rPr lang="tr-TR" smtClean="0"/>
-              <a:t>17</a:t>
-            </a:fld>
-            <a:endParaRPr lang="tr-TR" dirty="0"/>
-          </a:p>
-        </p:txBody>
-      </p:sp>
-    </p:spTree>
-    <p:extLst>
-      <p:ext uri="{BB962C8B-B14F-4D97-AF65-F5344CB8AC3E}">
-        <p14:creationId xmlns:p14="http://schemas.microsoft.com/office/powerpoint/2010/main" val="1446934019"/>
-      </p:ext>
-    </p:extLst>
-  </p:cSld>
-  <p:clrMapOvr>
-    <a:masterClrMapping/>
-  </p:clrMapOvr>
-</p:sld>
-</file>
-
 <file path=ppt/slides/slide18.xml><?xml version="1.0" encoding="utf-8"?>
 <p:sld xmlns:a="http://schemas.openxmlformats.org/drawingml/2006/main" xmlns:r="http://schemas.openxmlformats.org/officeDocument/2006/relationships" xmlns:p="http://schemas.openxmlformats.org/presentationml/2006/main">
   <p:cSld>
@@ -7899,7 +8206,7 @@
           <p:cNvPr id="2" name="Title 1">
             <a:extLst>
               <a:ext uri="{FF2B5EF4-FFF2-40B4-BE49-F238E27FC236}">
-                <a16:creationId xmlns:a16="http://schemas.microsoft.com/office/drawing/2014/main" id="{A8BBD9F0-0A77-2745-A4A0-B263D431E153}"/>
+                <a16:creationId xmlns:a16="http://schemas.microsoft.com/office/drawing/2014/main" id="{91323331-E0E8-2D4A-995E-9C2E696E93E7}"/>
               </a:ext>
             </a:extLst>
           </p:cNvPr>
@@ -7910,6 +8217,41 @@
             <p:ph type="title"/>
           </p:nvPr>
         </p:nvSpPr>
+        <p:spPr>
+          <a:xfrm>
+            <a:off x="838200" y="365125"/>
+            <a:ext cx="11542986" cy="1325563"/>
+          </a:xfrm>
+        </p:spPr>
+        <p:txBody>
+          <a:bodyPr>
+            <a:normAutofit/>
+          </a:bodyPr>
+          <a:lstStyle/>
+          <a:p>
+            <a:r>
+              <a:rPr lang="tr-TR" dirty="0"/>
+              <a:t>Derleyici(Compiler) ve Yorumlayıcı(Interpreter)</a:t>
+            </a:r>
+          </a:p>
+        </p:txBody>
+      </p:sp>
+      <p:sp>
+        <p:nvSpPr>
+          <p:cNvPr id="3" name="Content Placeholder 2">
+            <a:extLst>
+              <a:ext uri="{FF2B5EF4-FFF2-40B4-BE49-F238E27FC236}">
+                <a16:creationId xmlns:a16="http://schemas.microsoft.com/office/drawing/2014/main" id="{E6CCB8F0-F21A-4F48-AE13-2DC194106EEB}"/>
+              </a:ext>
+            </a:extLst>
+          </p:cNvPr>
+          <p:cNvSpPr>
+            <a:spLocks noGrp="1"/>
+          </p:cNvSpPr>
+          <p:nvPr>
+            <p:ph idx="1"/>
+          </p:nvPr>
+        </p:nvSpPr>
         <p:spPr/>
         <p:txBody>
           <a:bodyPr/>
@@ -7917,109 +8259,35 @@
           <a:p>
             <a:r>
               <a:rPr lang="tr-TR" dirty="0"/>
-              <a:t>Python</a:t>
-            </a:r>
-          </a:p>
-        </p:txBody>
-      </p:sp>
-      <p:sp>
-        <p:nvSpPr>
-          <p:cNvPr id="3" name="Content Placeholder 2">
-            <a:extLst>
-              <a:ext uri="{FF2B5EF4-FFF2-40B4-BE49-F238E27FC236}">
-                <a16:creationId xmlns:a16="http://schemas.microsoft.com/office/drawing/2014/main" id="{D1057DE3-B500-9649-9A7D-287FBB306577}"/>
-              </a:ext>
-            </a:extLst>
-          </p:cNvPr>
-          <p:cNvSpPr>
-            <a:spLocks noGrp="1"/>
-          </p:cNvSpPr>
-          <p:nvPr>
-            <p:ph idx="1"/>
-          </p:nvPr>
-        </p:nvSpPr>
-        <p:spPr/>
-        <p:txBody>
-          <a:bodyPr/>
-          <a:lstStyle/>
+              <a:t>Bahsettiğim üzere derlenen diller çalıştırılmadan önce makine diline derleyiciler tarafından tercüme edilmesi gerekir.</a:t>
+            </a:r>
+          </a:p>
+          <a:p>
+            <a:pPr marL="0" indent="0">
+              <a:buNone/>
+            </a:pPr>
+            <a:endParaRPr lang="tr-TR" dirty="0"/>
+          </a:p>
           <a:p>
             <a:r>
               <a:rPr lang="tr-TR" dirty="0"/>
-              <a:t>İki </a:t>
+              <a:t>Yorumlayıcı, kaynak kodu komut komut okuyup üzerinde çalışılan makinenin komut setine çevirerek çalıştıran bir programdır. Yorumlanarak çalıştırılan yüksek seviyeli diller doğrudan yorumlanmazlar. Genellikle bir ara forma(</a:t>
             </a:r>
             <a:r>
               <a:rPr lang="tr-TR" dirty="0" err="1"/>
-              <a:t>modu</a:t>
+              <a:t>Opcode</a:t>
             </a:r>
             <a:r>
               <a:rPr lang="tr-TR" dirty="0"/>
-              <a:t> var: </a:t>
+              <a:t>, </a:t>
             </a:r>
             <a:r>
               <a:rPr lang="tr-TR" dirty="0" err="1"/>
-              <a:t>interactive</a:t>
+              <a:t>Bytecode</a:t>
             </a:r>
             <a:r>
               <a:rPr lang="tr-TR" dirty="0"/>
-              <a:t> (etkileşim) </a:t>
-            </a:r>
-            <a:r>
-              <a:rPr lang="tr-TR" dirty="0" err="1"/>
-              <a:t>mod</a:t>
-            </a:r>
-            <a:r>
-              <a:rPr lang="tr-TR" dirty="0"/>
-              <a:t> ve </a:t>
-            </a:r>
-            <a:r>
-              <a:rPr lang="tr-TR" dirty="0" err="1"/>
-              <a:t>script</a:t>
-            </a:r>
-            <a:r>
-              <a:rPr lang="tr-TR" dirty="0"/>
-              <a:t> (komut dosyası) </a:t>
-            </a:r>
-            <a:r>
-              <a:rPr lang="tr-TR" dirty="0" err="1"/>
-              <a:t>modu</a:t>
-            </a:r>
-            <a:r>
-              <a:rPr lang="tr-TR" dirty="0"/>
-              <a:t>.</a:t>
-            </a:r>
-          </a:p>
-          <a:p>
-            <a:r>
-              <a:rPr lang="tr-TR" dirty="0"/>
-              <a:t>Etkileşimli </a:t>
-            </a:r>
-            <a:r>
-              <a:rPr lang="tr-TR" dirty="0" err="1"/>
-              <a:t>modda</a:t>
-            </a:r>
-            <a:r>
-              <a:rPr lang="tr-TR" dirty="0"/>
-              <a:t> Python programlarını yazdığınızda yorumlayıcı sonucu yazdırır. </a:t>
-            </a:r>
-          </a:p>
-          <a:p>
-            <a:r>
-              <a:rPr lang="tr-TR" dirty="0"/>
-              <a:t>Alternatif olarak, bir dosyada kod saklayabilir ve komut dosyası olarak adlandırılan dosyanın içeriğini yürütmek için yorumlayıcıyı kullanabilirsiniz.</a:t>
-            </a:r>
-          </a:p>
-          <a:p>
-            <a:r>
-              <a:rPr lang="tr-TR" dirty="0"/>
-              <a:t>Kurallara göre, Python komut dosyaları “.</a:t>
-            </a:r>
-            <a:r>
-              <a:rPr lang="tr-TR" dirty="0" err="1"/>
-              <a:t>py</a:t>
-            </a:r>
-            <a:r>
-              <a:rPr lang="tr-TR" dirty="0"/>
-              <a:t>” ile biterler.</a:t>
+              <a:t> vs.) derlenir ve bu kodlar yorumlanarak yerel makine diline çevrilir ve işletilir. Python gibi yorumlanan diller aslında yorumlama aşamasına geçilmeden önce en az 1 kere derlenirler.</a:t>
             </a:r>
           </a:p>
         </p:txBody>
@@ -8029,7 +8297,7 @@
           <p:cNvPr id="4" name="Date Placeholder 3">
             <a:extLst>
               <a:ext uri="{FF2B5EF4-FFF2-40B4-BE49-F238E27FC236}">
-                <a16:creationId xmlns:a16="http://schemas.microsoft.com/office/drawing/2014/main" id="{5E32E187-5299-CF4F-8FB4-F056CD928B60}"/>
+                <a16:creationId xmlns:a16="http://schemas.microsoft.com/office/drawing/2014/main" id="{E82D68ED-B44D-F44A-9D02-810B047D4D3B}"/>
               </a:ext>
             </a:extLst>
           </p:cNvPr>
@@ -8058,7 +8326,7 @@
           <p:cNvPr id="5" name="Slide Number Placeholder 4">
             <a:extLst>
               <a:ext uri="{FF2B5EF4-FFF2-40B4-BE49-F238E27FC236}">
-                <a16:creationId xmlns:a16="http://schemas.microsoft.com/office/drawing/2014/main" id="{E3789D76-D8A4-8743-8CB9-4BC17D0BF6FE}"/>
+                <a16:creationId xmlns:a16="http://schemas.microsoft.com/office/drawing/2014/main" id="{2A7DA56E-4868-3149-9A96-60659332E995}"/>
               </a:ext>
             </a:extLst>
           </p:cNvPr>
@@ -8085,7 +8353,7 @@
     </p:spTree>
     <p:extLst>
       <p:ext uri="{BB962C8B-B14F-4D97-AF65-F5344CB8AC3E}">
-        <p14:creationId xmlns:p14="http://schemas.microsoft.com/office/powerpoint/2010/main" val="4175489785"/>
+        <p14:creationId xmlns:p14="http://schemas.microsoft.com/office/powerpoint/2010/main" val="4164482068"/>
       </p:ext>
     </p:extLst>
   </p:cSld>
@@ -8117,7 +8385,7 @@
           <p:cNvPr id="2" name="Title 1">
             <a:extLst>
               <a:ext uri="{FF2B5EF4-FFF2-40B4-BE49-F238E27FC236}">
-                <a16:creationId xmlns:a16="http://schemas.microsoft.com/office/drawing/2014/main" id="{B2FC8C66-3936-6948-A680-63E5F26E1158}"/>
+                <a16:creationId xmlns:a16="http://schemas.microsoft.com/office/drawing/2014/main" id="{D57B2DFC-522F-0642-9E9C-9B4DD63DD34D}"/>
               </a:ext>
             </a:extLst>
           </p:cNvPr>
@@ -8133,48 +8401,106 @@
           <a:bodyPr/>
           <a:lstStyle/>
           <a:p>
+            <a:pPr algn="ctr"/>
             <a:r>
               <a:rPr lang="tr-TR" dirty="0"/>
-              <a:t>Neden Python?</a:t>
-            </a:r>
-          </a:p>
-        </p:txBody>
-      </p:sp>
-      <p:pic>
-        <p:nvPicPr>
-          <p:cNvPr id="7" name="Content Placeholder 6">
-            <a:extLst>
-              <a:ext uri="{FF2B5EF4-FFF2-40B4-BE49-F238E27FC236}">
-                <a16:creationId xmlns:a16="http://schemas.microsoft.com/office/drawing/2014/main" id="{D16FFCD8-DBEF-3A4C-A0C8-3FC1F7ECC60C}"/>
-              </a:ext>
-            </a:extLst>
-          </p:cNvPr>
-          <p:cNvPicPr>
-            <a:picLocks noGrp="1" noChangeAspect="1"/>
-          </p:cNvPicPr>
+              <a:t>Python</a:t>
+            </a:r>
+          </a:p>
+        </p:txBody>
+      </p:sp>
+      <p:sp>
+        <p:nvSpPr>
+          <p:cNvPr id="3" name="Content Placeholder 2">
+            <a:extLst>
+              <a:ext uri="{FF2B5EF4-FFF2-40B4-BE49-F238E27FC236}">
+                <a16:creationId xmlns:a16="http://schemas.microsoft.com/office/drawing/2014/main" id="{5680630C-BCFD-2141-A0DC-68104FAFD453}"/>
+              </a:ext>
+            </a:extLst>
+          </p:cNvPr>
+          <p:cNvSpPr>
+            <a:spLocks noGrp="1"/>
+          </p:cNvSpPr>
           <p:nvPr>
             <p:ph idx="1"/>
           </p:nvPr>
-        </p:nvPicPr>
-        <p:blipFill>
-          <a:blip r:embed="rId2"/>
-          <a:stretch>
-            <a:fillRect/>
-          </a:stretch>
-        </p:blipFill>
-        <p:spPr>
-          <a:xfrm>
-            <a:off x="838200" y="1425575"/>
-            <a:ext cx="9468681" cy="4351338"/>
-          </a:xfrm>
-        </p:spPr>
-      </p:pic>
+        </p:nvSpPr>
+        <p:spPr/>
+        <p:txBody>
+          <a:bodyPr>
+            <a:normAutofit/>
+          </a:bodyPr>
+          <a:lstStyle/>
+          <a:p>
+            <a:r>
+              <a:rPr lang="tr-TR" dirty="0"/>
+              <a:t>Python, yorumlanmış, nesne yönelimli, üst düzey bir programlama dilidir.</a:t>
+            </a:r>
+          </a:p>
+          <a:p>
+            <a:pPr marL="0" indent="0">
+              <a:buNone/>
+            </a:pPr>
+            <a:endParaRPr lang="tr-TR" dirty="0"/>
+          </a:p>
+          <a:p>
+            <a:r>
+              <a:rPr lang="tr-TR" dirty="0"/>
+              <a:t>1990'ların başında, </a:t>
+            </a:r>
+            <a:r>
+              <a:rPr lang="tr-TR" dirty="0" err="1"/>
+              <a:t>Guido</a:t>
+            </a:r>
+            <a:r>
+              <a:rPr lang="tr-TR" dirty="0"/>
+              <a:t> </a:t>
+            </a:r>
+            <a:r>
+              <a:rPr lang="tr-TR" dirty="0" err="1"/>
+              <a:t>van</a:t>
+            </a:r>
+            <a:r>
+              <a:rPr lang="tr-TR" dirty="0"/>
+              <a:t> </a:t>
+            </a:r>
+            <a:r>
+              <a:rPr lang="tr-TR" dirty="0" err="1"/>
+              <a:t>Rossum</a:t>
+            </a:r>
+            <a:r>
+              <a:rPr lang="tr-TR" dirty="0"/>
+              <a:t>, programlama dili olacak </a:t>
+            </a:r>
+            <a:r>
+              <a:rPr lang="tr-TR" dirty="0" err="1"/>
+              <a:t>Python’ı</a:t>
+            </a:r>
+            <a:r>
+              <a:rPr lang="tr-TR" dirty="0"/>
+              <a:t> tasarladı.</a:t>
+            </a:r>
+          </a:p>
+          <a:p>
+            <a:pPr marL="0" indent="0">
+              <a:buNone/>
+            </a:pPr>
+            <a:endParaRPr lang="tr-TR" dirty="0"/>
+          </a:p>
+          <a:p>
+            <a:r>
+              <a:rPr lang="tr-TR" dirty="0"/>
+              <a:t>Python programları Python yorumlayıcısı tarafından yürütülür. </a:t>
+            </a:r>
+          </a:p>
+        </p:txBody>
+      </p:sp>
       <p:sp>
         <p:nvSpPr>
           <p:cNvPr id="4" name="Date Placeholder 3">
             <a:extLst>
               <a:ext uri="{FF2B5EF4-FFF2-40B4-BE49-F238E27FC236}">
-                <a16:creationId xmlns:a16="http://schemas.microsoft.com/office/drawing/2014/main" id="{83CAE64F-D7FA-4848-B0D3-0DAE44C28DC1}"/>
+                <a16:creationId xmlns:a16="http://schemas.microsoft.com/office/drawing/2014/main" id="{3E6C67C0-CD10-674E-9C82-B15FFA0F5E3D}"/>
               </a:ext>
             </a:extLst>
           </p:cNvPr>
@@ -8203,7 +8529,7 @@
           <p:cNvPr id="5" name="Slide Number Placeholder 4">
             <a:extLst>
               <a:ext uri="{FF2B5EF4-FFF2-40B4-BE49-F238E27FC236}">
-                <a16:creationId xmlns:a16="http://schemas.microsoft.com/office/drawing/2014/main" id="{E2503306-CC18-1C46-A5EA-B0D964CB391C}"/>
+                <a16:creationId xmlns:a16="http://schemas.microsoft.com/office/drawing/2014/main" id="{842DCBCE-FA5D-5140-95EB-802E7D5E8A8B}"/>
               </a:ext>
             </a:extLst>
           </p:cNvPr>
@@ -8230,7 +8556,7 @@
     </p:spTree>
     <p:extLst>
       <p:ext uri="{BB962C8B-B14F-4D97-AF65-F5344CB8AC3E}">
-        <p14:creationId xmlns:p14="http://schemas.microsoft.com/office/powerpoint/2010/main" val="4052736121"/>
+        <p14:creationId xmlns:p14="http://schemas.microsoft.com/office/powerpoint/2010/main" val="1446934019"/>
       </p:ext>
     </p:extLst>
   </p:cSld>
@@ -8468,6 +8794,369 @@
           <p:cNvPr id="2" name="Title 1">
             <a:extLst>
               <a:ext uri="{FF2B5EF4-FFF2-40B4-BE49-F238E27FC236}">
+                <a16:creationId xmlns:a16="http://schemas.microsoft.com/office/drawing/2014/main" id="{A8BBD9F0-0A77-2745-A4A0-B263D431E153}"/>
+              </a:ext>
+            </a:extLst>
+          </p:cNvPr>
+          <p:cNvSpPr>
+            <a:spLocks noGrp="1"/>
+          </p:cNvSpPr>
+          <p:nvPr>
+            <p:ph type="title"/>
+          </p:nvPr>
+        </p:nvSpPr>
+        <p:spPr/>
+        <p:txBody>
+          <a:bodyPr/>
+          <a:lstStyle/>
+          <a:p>
+            <a:r>
+              <a:rPr lang="tr-TR" dirty="0"/>
+              <a:t>Python</a:t>
+            </a:r>
+          </a:p>
+        </p:txBody>
+      </p:sp>
+      <p:sp>
+        <p:nvSpPr>
+          <p:cNvPr id="3" name="Content Placeholder 2">
+            <a:extLst>
+              <a:ext uri="{FF2B5EF4-FFF2-40B4-BE49-F238E27FC236}">
+                <a16:creationId xmlns:a16="http://schemas.microsoft.com/office/drawing/2014/main" id="{D1057DE3-B500-9649-9A7D-287FBB306577}"/>
+              </a:ext>
+            </a:extLst>
+          </p:cNvPr>
+          <p:cNvSpPr>
+            <a:spLocks noGrp="1"/>
+          </p:cNvSpPr>
+          <p:nvPr>
+            <p:ph idx="1"/>
+          </p:nvPr>
+        </p:nvSpPr>
+        <p:spPr/>
+        <p:txBody>
+          <a:bodyPr/>
+          <a:lstStyle/>
+          <a:p>
+            <a:r>
+              <a:rPr lang="tr-TR" dirty="0"/>
+              <a:t>İki </a:t>
+            </a:r>
+            <a:r>
+              <a:rPr lang="tr-TR" dirty="0" err="1"/>
+              <a:t>modu</a:t>
+            </a:r>
+            <a:r>
+              <a:rPr lang="tr-TR" dirty="0"/>
+              <a:t> var: </a:t>
+            </a:r>
+            <a:r>
+              <a:rPr lang="tr-TR" dirty="0" err="1"/>
+              <a:t>interactive</a:t>
+            </a:r>
+            <a:r>
+              <a:rPr lang="tr-TR" dirty="0"/>
+              <a:t> (etkileşim) </a:t>
+            </a:r>
+            <a:r>
+              <a:rPr lang="tr-TR" dirty="0" err="1"/>
+              <a:t>mod</a:t>
+            </a:r>
+            <a:r>
+              <a:rPr lang="tr-TR" dirty="0"/>
+              <a:t> ve </a:t>
+            </a:r>
+            <a:r>
+              <a:rPr lang="tr-TR" dirty="0" err="1"/>
+              <a:t>script</a:t>
+            </a:r>
+            <a:r>
+              <a:rPr lang="tr-TR" dirty="0"/>
+              <a:t> (komut dosyası) </a:t>
+            </a:r>
+            <a:r>
+              <a:rPr lang="tr-TR" dirty="0" err="1"/>
+              <a:t>modu</a:t>
+            </a:r>
+            <a:r>
+              <a:rPr lang="tr-TR" dirty="0"/>
+              <a:t>.</a:t>
+            </a:r>
+          </a:p>
+          <a:p>
+            <a:r>
+              <a:rPr lang="tr-TR" dirty="0"/>
+              <a:t>Etkileşimli </a:t>
+            </a:r>
+            <a:r>
+              <a:rPr lang="tr-TR" dirty="0" err="1"/>
+              <a:t>modda</a:t>
+            </a:r>
+            <a:r>
+              <a:rPr lang="tr-TR" dirty="0"/>
+              <a:t> Python programlarını yazdığınızda yorumlayıcı sonucu yazdırır. </a:t>
+            </a:r>
+          </a:p>
+          <a:p>
+            <a:r>
+              <a:rPr lang="tr-TR" dirty="0"/>
+              <a:t>Alternatif olarak, bir dosyada kod saklayabilir ve komut dosyası olarak adlandırılan dosyanın içeriğini yürütmek için yorumlayıcıyı kullanabilirsiniz.</a:t>
+            </a:r>
+          </a:p>
+          <a:p>
+            <a:r>
+              <a:rPr lang="tr-TR" dirty="0"/>
+              <a:t>Kurallara göre, Python komut dosyaları “.</a:t>
+            </a:r>
+            <a:r>
+              <a:rPr lang="tr-TR" dirty="0" err="1"/>
+              <a:t>py</a:t>
+            </a:r>
+            <a:r>
+              <a:rPr lang="tr-TR" dirty="0"/>
+              <a:t>” ile biterler.</a:t>
+            </a:r>
+          </a:p>
+        </p:txBody>
+      </p:sp>
+      <p:sp>
+        <p:nvSpPr>
+          <p:cNvPr id="4" name="Date Placeholder 3">
+            <a:extLst>
+              <a:ext uri="{FF2B5EF4-FFF2-40B4-BE49-F238E27FC236}">
+                <a16:creationId xmlns:a16="http://schemas.microsoft.com/office/drawing/2014/main" id="{5E32E187-5299-CF4F-8FB4-F056CD928B60}"/>
+              </a:ext>
+            </a:extLst>
+          </p:cNvPr>
+          <p:cNvSpPr>
+            <a:spLocks noGrp="1"/>
+          </p:cNvSpPr>
+          <p:nvPr>
+            <p:ph type="dt" sz="half" idx="10"/>
+          </p:nvPr>
+        </p:nvSpPr>
+        <p:spPr/>
+        <p:txBody>
+          <a:bodyPr/>
+          <a:lstStyle/>
+          <a:p>
+            <a:r>
+              <a:rPr lang="tr-TR"/>
+              <a:t>Medical Artificial Intelligence</a:t>
+            </a:r>
+            <a:endParaRPr lang="tr-TR" dirty="0"/>
+          </a:p>
+        </p:txBody>
+      </p:sp>
+      <p:sp>
+        <p:nvSpPr>
+          <p:cNvPr id="5" name="Slide Number Placeholder 4">
+            <a:extLst>
+              <a:ext uri="{FF2B5EF4-FFF2-40B4-BE49-F238E27FC236}">
+                <a16:creationId xmlns:a16="http://schemas.microsoft.com/office/drawing/2014/main" id="{E3789D76-D8A4-8743-8CB9-4BC17D0BF6FE}"/>
+              </a:ext>
+            </a:extLst>
+          </p:cNvPr>
+          <p:cNvSpPr>
+            <a:spLocks noGrp="1"/>
+          </p:cNvSpPr>
+          <p:nvPr>
+            <p:ph type="sldNum" sz="quarter" idx="12"/>
+          </p:nvPr>
+        </p:nvSpPr>
+        <p:spPr/>
+        <p:txBody>
+          <a:bodyPr/>
+          <a:lstStyle/>
+          <a:p>
+            <a:fld id="{4119457A-5965-C148-8898-E00E7A560E34}" type="slidenum">
+              <a:rPr lang="tr-TR" smtClean="0"/>
+              <a:t>20</a:t>
+            </a:fld>
+            <a:endParaRPr lang="tr-TR" dirty="0"/>
+          </a:p>
+        </p:txBody>
+      </p:sp>
+    </p:spTree>
+    <p:extLst>
+      <p:ext uri="{BB962C8B-B14F-4D97-AF65-F5344CB8AC3E}">
+        <p14:creationId xmlns:p14="http://schemas.microsoft.com/office/powerpoint/2010/main" val="4175489785"/>
+      </p:ext>
+    </p:extLst>
+  </p:cSld>
+  <p:clrMapOvr>
+    <a:masterClrMapping/>
+  </p:clrMapOvr>
+</p:sld>
+</file>
+
+<file path=ppt/slides/slide21.xml><?xml version="1.0" encoding="utf-8"?>
+<p:sld xmlns:a="http://schemas.openxmlformats.org/drawingml/2006/main" xmlns:r="http://schemas.openxmlformats.org/officeDocument/2006/relationships" xmlns:p="http://schemas.openxmlformats.org/presentationml/2006/main">
+  <p:cSld>
+    <p:spTree>
+      <p:nvGrpSpPr>
+        <p:cNvPr id="1" name=""/>
+        <p:cNvGrpSpPr/>
+        <p:nvPr/>
+      </p:nvGrpSpPr>
+      <p:grpSpPr>
+        <a:xfrm>
+          <a:off x="0" y="0"/>
+          <a:ext cx="0" cy="0"/>
+          <a:chOff x="0" y="0"/>
+          <a:chExt cx="0" cy="0"/>
+        </a:xfrm>
+      </p:grpSpPr>
+      <p:sp>
+        <p:nvSpPr>
+          <p:cNvPr id="2" name="Title 1">
+            <a:extLst>
+              <a:ext uri="{FF2B5EF4-FFF2-40B4-BE49-F238E27FC236}">
+                <a16:creationId xmlns:a16="http://schemas.microsoft.com/office/drawing/2014/main" id="{B2FC8C66-3936-6948-A680-63E5F26E1158}"/>
+              </a:ext>
+            </a:extLst>
+          </p:cNvPr>
+          <p:cNvSpPr>
+            <a:spLocks noGrp="1"/>
+          </p:cNvSpPr>
+          <p:nvPr>
+            <p:ph type="title"/>
+          </p:nvPr>
+        </p:nvSpPr>
+        <p:spPr/>
+        <p:txBody>
+          <a:bodyPr/>
+          <a:lstStyle/>
+          <a:p>
+            <a:r>
+              <a:rPr lang="tr-TR" dirty="0"/>
+              <a:t>Neden Python?</a:t>
+            </a:r>
+          </a:p>
+        </p:txBody>
+      </p:sp>
+      <p:pic>
+        <p:nvPicPr>
+          <p:cNvPr id="7" name="Content Placeholder 6">
+            <a:extLst>
+              <a:ext uri="{FF2B5EF4-FFF2-40B4-BE49-F238E27FC236}">
+                <a16:creationId xmlns:a16="http://schemas.microsoft.com/office/drawing/2014/main" id="{D16FFCD8-DBEF-3A4C-A0C8-3FC1F7ECC60C}"/>
+              </a:ext>
+            </a:extLst>
+          </p:cNvPr>
+          <p:cNvPicPr>
+            <a:picLocks noGrp="1" noChangeAspect="1"/>
+          </p:cNvPicPr>
+          <p:nvPr>
+            <p:ph idx="1"/>
+          </p:nvPr>
+        </p:nvPicPr>
+        <p:blipFill>
+          <a:blip r:embed="rId2"/>
+          <a:stretch>
+            <a:fillRect/>
+          </a:stretch>
+        </p:blipFill>
+        <p:spPr>
+          <a:xfrm>
+            <a:off x="838200" y="1425575"/>
+            <a:ext cx="9468681" cy="4351338"/>
+          </a:xfrm>
+        </p:spPr>
+      </p:pic>
+      <p:sp>
+        <p:nvSpPr>
+          <p:cNvPr id="4" name="Date Placeholder 3">
+            <a:extLst>
+              <a:ext uri="{FF2B5EF4-FFF2-40B4-BE49-F238E27FC236}">
+                <a16:creationId xmlns:a16="http://schemas.microsoft.com/office/drawing/2014/main" id="{83CAE64F-D7FA-4848-B0D3-0DAE44C28DC1}"/>
+              </a:ext>
+            </a:extLst>
+          </p:cNvPr>
+          <p:cNvSpPr>
+            <a:spLocks noGrp="1"/>
+          </p:cNvSpPr>
+          <p:nvPr>
+            <p:ph type="dt" sz="half" idx="10"/>
+          </p:nvPr>
+        </p:nvSpPr>
+        <p:spPr/>
+        <p:txBody>
+          <a:bodyPr/>
+          <a:lstStyle/>
+          <a:p>
+            <a:r>
+              <a:rPr lang="tr-TR"/>
+              <a:t>Medical Artificial Intelligence</a:t>
+            </a:r>
+            <a:endParaRPr lang="tr-TR" dirty="0"/>
+          </a:p>
+        </p:txBody>
+      </p:sp>
+      <p:sp>
+        <p:nvSpPr>
+          <p:cNvPr id="5" name="Slide Number Placeholder 4">
+            <a:extLst>
+              <a:ext uri="{FF2B5EF4-FFF2-40B4-BE49-F238E27FC236}">
+                <a16:creationId xmlns:a16="http://schemas.microsoft.com/office/drawing/2014/main" id="{E2503306-CC18-1C46-A5EA-B0D964CB391C}"/>
+              </a:ext>
+            </a:extLst>
+          </p:cNvPr>
+          <p:cNvSpPr>
+            <a:spLocks noGrp="1"/>
+          </p:cNvSpPr>
+          <p:nvPr>
+            <p:ph type="sldNum" sz="quarter" idx="12"/>
+          </p:nvPr>
+        </p:nvSpPr>
+        <p:spPr/>
+        <p:txBody>
+          <a:bodyPr/>
+          <a:lstStyle/>
+          <a:p>
+            <a:fld id="{4119457A-5965-C148-8898-E00E7A560E34}" type="slidenum">
+              <a:rPr lang="tr-TR" smtClean="0"/>
+              <a:t>21</a:t>
+            </a:fld>
+            <a:endParaRPr lang="tr-TR" dirty="0"/>
+          </a:p>
+        </p:txBody>
+      </p:sp>
+    </p:spTree>
+    <p:extLst>
+      <p:ext uri="{BB962C8B-B14F-4D97-AF65-F5344CB8AC3E}">
+        <p14:creationId xmlns:p14="http://schemas.microsoft.com/office/powerpoint/2010/main" val="4052736121"/>
+      </p:ext>
+    </p:extLst>
+  </p:cSld>
+  <p:clrMapOvr>
+    <a:masterClrMapping/>
+  </p:clrMapOvr>
+</p:sld>
+</file>
+
+<file path=ppt/slides/slide22.xml><?xml version="1.0" encoding="utf-8"?>
+<p:sld xmlns:a="http://schemas.openxmlformats.org/drawingml/2006/main" xmlns:r="http://schemas.openxmlformats.org/officeDocument/2006/relationships" xmlns:p="http://schemas.openxmlformats.org/presentationml/2006/main">
+  <p:cSld>
+    <p:spTree>
+      <p:nvGrpSpPr>
+        <p:cNvPr id="1" name=""/>
+        <p:cNvGrpSpPr/>
+        <p:nvPr/>
+      </p:nvGrpSpPr>
+      <p:grpSpPr>
+        <a:xfrm>
+          <a:off x="0" y="0"/>
+          <a:ext cx="0" cy="0"/>
+          <a:chOff x="0" y="0"/>
+          <a:chExt cx="0" cy="0"/>
+        </a:xfrm>
+      </p:grpSpPr>
+      <p:sp>
+        <p:nvSpPr>
+          <p:cNvPr id="2" name="Title 1">
+            <a:extLst>
+              <a:ext uri="{FF2B5EF4-FFF2-40B4-BE49-F238E27FC236}">
                 <a16:creationId xmlns:a16="http://schemas.microsoft.com/office/drawing/2014/main" id="{A8FFC037-4536-1A41-892B-3028494A78A1}"/>
               </a:ext>
             </a:extLst>
@@ -8572,7 +9261,7 @@
           <a:p>
             <a:fld id="{4119457A-5965-C148-8898-E00E7A560E34}" type="slidenum">
               <a:rPr lang="tr-TR" smtClean="0"/>
-              <a:t>20</a:t>
+              <a:t>22</a:t>
             </a:fld>
             <a:endParaRPr lang="tr-TR" dirty="0"/>
           </a:p>
@@ -8621,7 +9310,7 @@
 </p:sld>
 </file>
 
-<file path=ppt/slides/slide21.xml><?xml version="1.0" encoding="utf-8"?>
+<file path=ppt/slides/slide23.xml><?xml version="1.0" encoding="utf-8"?>
 <p:sld xmlns:a="http://schemas.openxmlformats.org/drawingml/2006/main" xmlns:r="http://schemas.openxmlformats.org/officeDocument/2006/relationships" xmlns:p="http://schemas.openxmlformats.org/presentationml/2006/main">
   <p:cSld>
     <p:spTree>
@@ -8793,7 +9482,7 @@
           <a:p>
             <a:fld id="{4119457A-5965-C148-8898-E00E7A560E34}" type="slidenum">
               <a:rPr lang="tr-TR" smtClean="0"/>
-              <a:t>21</a:t>
+              <a:t>23</a:t>
             </a:fld>
             <a:endParaRPr lang="tr-TR" dirty="0"/>
           </a:p>
@@ -8812,7 +9501,7 @@
 </p:sld>
 </file>
 
-<file path=ppt/slides/slide22.xml><?xml version="1.0" encoding="utf-8"?>
+<file path=ppt/slides/slide24.xml><?xml version="1.0" encoding="utf-8"?>
 <p:sld xmlns:a="http://schemas.openxmlformats.org/drawingml/2006/main" xmlns:r="http://schemas.openxmlformats.org/officeDocument/2006/relationships" xmlns:p="http://schemas.openxmlformats.org/presentationml/2006/main">
   <p:cSld>
     <p:spTree>
@@ -8952,7 +9641,7 @@
           <a:p>
             <a:fld id="{4119457A-5965-C148-8898-E00E7A560E34}" type="slidenum">
               <a:rPr lang="tr-TR" smtClean="0"/>
-              <a:t>22</a:t>
+              <a:t>24</a:t>
             </a:fld>
             <a:endParaRPr lang="tr-TR" dirty="0"/>
           </a:p>
@@ -9752,7 +10441,7 @@
           <p:cNvPr id="2" name="Title 1">
             <a:extLst>
               <a:ext uri="{FF2B5EF4-FFF2-40B4-BE49-F238E27FC236}">
-                <a16:creationId xmlns:a16="http://schemas.microsoft.com/office/drawing/2014/main" id="{8E282CD7-3A56-E64F-93CA-D6C29A00E8AC}"/>
+                <a16:creationId xmlns:a16="http://schemas.microsoft.com/office/drawing/2014/main" id="{420C1C16-2CDB-0C4D-B48C-61F9D3A0B9B0}"/>
               </a:ext>
             </a:extLst>
           </p:cNvPr>
@@ -9770,84 +10459,46 @@
           <a:p>
             <a:r>
               <a:rPr lang="tr-TR" dirty="0"/>
-              <a:t>Bilgi veri yapıları ile nasıl temsil edilir?</a:t>
-            </a:r>
-          </a:p>
-        </p:txBody>
-      </p:sp>
-      <p:sp>
-        <p:nvSpPr>
-          <p:cNvPr id="3" name="Content Placeholder 2">
-            <a:extLst>
-              <a:ext uri="{FF2B5EF4-FFF2-40B4-BE49-F238E27FC236}">
-                <a16:creationId xmlns:a16="http://schemas.microsoft.com/office/drawing/2014/main" id="{018E57A1-5960-C440-B49E-AEF88E9C6264}"/>
-              </a:ext>
-            </a:extLst>
-          </p:cNvPr>
-          <p:cNvSpPr>
-            <a:spLocks noGrp="1"/>
-          </p:cNvSpPr>
+              <a:t>Problemler</a:t>
+            </a:r>
+          </a:p>
+        </p:txBody>
+      </p:sp>
+      <p:pic>
+        <p:nvPicPr>
+          <p:cNvPr id="7" name="Content Placeholder 6" descr="A screenshot of a cell phone&#10;&#10;Description automatically generated">
+            <a:extLst>
+              <a:ext uri="{FF2B5EF4-FFF2-40B4-BE49-F238E27FC236}">
+                <a16:creationId xmlns:a16="http://schemas.microsoft.com/office/drawing/2014/main" id="{C094042E-55A7-644D-BB7E-326020746AED}"/>
+              </a:ext>
+            </a:extLst>
+          </p:cNvPr>
+          <p:cNvPicPr>
+            <a:picLocks noGrp="1" noChangeAspect="1"/>
+          </p:cNvPicPr>
           <p:nvPr>
             <p:ph idx="1"/>
           </p:nvPr>
-        </p:nvSpPr>
-        <p:spPr/>
-        <p:txBody>
-          <a:bodyPr/>
-          <a:lstStyle/>
-          <a:p>
-            <a:r>
-              <a:rPr lang="tr-TR" dirty="0"/>
-              <a:t>Objeler (Nesneler)</a:t>
-            </a:r>
-          </a:p>
-          <a:p>
-            <a:pPr lvl="1"/>
-            <a:r>
-              <a:rPr lang="tr-TR" dirty="0"/>
-              <a:t>Belirli birtakım metotlara ve/veya niteliklere sahip olan öğelere nesne adı verilir. Yani ‘nesne’ kelimesi, içinde birtakım metot ve/veya nitelikler barındıran öğeleri tanımlamak için kullanılan bir tabirden, basit bir isimlendirmeden ibarettir.</a:t>
-            </a:r>
-          </a:p>
-          <a:p>
-            <a:pPr lvl="1"/>
-            <a:endParaRPr lang="tr-TR" dirty="0"/>
-          </a:p>
-          <a:p>
-            <a:pPr lvl="1"/>
-            <a:r>
-              <a:rPr lang="tr-TR" dirty="0"/>
-              <a:t>Batuhan bir insandır.</a:t>
-            </a:r>
-          </a:p>
-          <a:p>
-            <a:pPr lvl="2"/>
-            <a:r>
-              <a:rPr lang="tr-TR" dirty="0"/>
-              <a:t>Konuşabilir, dinleyebilir, koşabilir, kod yazabilir etc.</a:t>
-            </a:r>
-          </a:p>
-          <a:p>
-            <a:pPr lvl="1"/>
-            <a:r>
-              <a:rPr lang="tr-TR" dirty="0"/>
-              <a:t>Bilgisayar bir makinedir.</a:t>
-            </a:r>
-          </a:p>
-          <a:p>
-            <a:pPr lvl="2"/>
-            <a:r>
-              <a:rPr lang="tr-TR" dirty="0"/>
-              <a:t>Bozulabilir, kırılabilir, işlem yapabilir etc.</a:t>
-            </a:r>
-          </a:p>
-        </p:txBody>
-      </p:sp>
+        </p:nvPicPr>
+        <p:blipFill>
+          <a:blip r:embed="rId2"/>
+          <a:stretch>
+            <a:fillRect/>
+          </a:stretch>
+        </p:blipFill>
+        <p:spPr>
+          <a:xfrm>
+            <a:off x="838200" y="1690688"/>
+            <a:ext cx="3945351" cy="4351338"/>
+          </a:xfrm>
+        </p:spPr>
+      </p:pic>
       <p:sp>
         <p:nvSpPr>
           <p:cNvPr id="4" name="Date Placeholder 3">
             <a:extLst>
               <a:ext uri="{FF2B5EF4-FFF2-40B4-BE49-F238E27FC236}">
-                <a16:creationId xmlns:a16="http://schemas.microsoft.com/office/drawing/2014/main" id="{8BDF3458-A264-DB46-9063-E9BEF0B6D6E3}"/>
+                <a16:creationId xmlns:a16="http://schemas.microsoft.com/office/drawing/2014/main" id="{5AEC84FC-410E-4545-947B-47459825CCF8}"/>
               </a:ext>
             </a:extLst>
           </p:cNvPr>
@@ -9876,7 +10527,7 @@
           <p:cNvPr id="5" name="Slide Number Placeholder 4">
             <a:extLst>
               <a:ext uri="{FF2B5EF4-FFF2-40B4-BE49-F238E27FC236}">
-                <a16:creationId xmlns:a16="http://schemas.microsoft.com/office/drawing/2014/main" id="{5DF9BA5E-BB07-8B4F-9B33-8759238E2C2F}"/>
+                <a16:creationId xmlns:a16="http://schemas.microsoft.com/office/drawing/2014/main" id="{A76787DF-8831-DA4B-BE73-6F2DE25301C1}"/>
               </a:ext>
             </a:extLst>
           </p:cNvPr>
@@ -9900,10 +10551,111 @@
           </a:p>
         </p:txBody>
       </p:sp>
+      <p:pic>
+        <p:nvPicPr>
+          <p:cNvPr id="9" name="Picture 8" descr="A screenshot of text&#10;&#10;Description automatically generated">
+            <a:extLst>
+              <a:ext uri="{FF2B5EF4-FFF2-40B4-BE49-F238E27FC236}">
+                <a16:creationId xmlns:a16="http://schemas.microsoft.com/office/drawing/2014/main" id="{279A8A4B-BE50-6A45-B694-E9C27181A03F}"/>
+              </a:ext>
+            </a:extLst>
+          </p:cNvPr>
+          <p:cNvPicPr>
+            <a:picLocks noChangeAspect="1"/>
+          </p:cNvPicPr>
+          <p:nvPr/>
+        </p:nvPicPr>
+        <p:blipFill>
+          <a:blip r:embed="rId3"/>
+          <a:stretch>
+            <a:fillRect/>
+          </a:stretch>
+        </p:blipFill>
+        <p:spPr>
+          <a:xfrm>
+            <a:off x="8653036" y="1690688"/>
+            <a:ext cx="3538964" cy="4277409"/>
+          </a:xfrm>
+          <a:prstGeom prst="rect">
+            <a:avLst/>
+          </a:prstGeom>
+        </p:spPr>
+      </p:pic>
+      <p:pic>
+        <p:nvPicPr>
+          <p:cNvPr id="11" name="Picture 10" descr="A screenshot of a cell phone&#10;&#10;Description automatically generated">
+            <a:extLst>
+              <a:ext uri="{FF2B5EF4-FFF2-40B4-BE49-F238E27FC236}">
+                <a16:creationId xmlns:a16="http://schemas.microsoft.com/office/drawing/2014/main" id="{8948BE5E-D379-6F4B-834F-B1901AD1FA51}"/>
+              </a:ext>
+            </a:extLst>
+          </p:cNvPr>
+          <p:cNvPicPr>
+            <a:picLocks noChangeAspect="1"/>
+          </p:cNvPicPr>
+          <p:nvPr/>
+        </p:nvPicPr>
+        <p:blipFill>
+          <a:blip r:embed="rId4"/>
+          <a:stretch>
+            <a:fillRect/>
+          </a:stretch>
+        </p:blipFill>
+        <p:spPr>
+          <a:xfrm>
+            <a:off x="4858251" y="1690688"/>
+            <a:ext cx="3213693" cy="4351338"/>
+          </a:xfrm>
+          <a:prstGeom prst="rect">
+            <a:avLst/>
+          </a:prstGeom>
+        </p:spPr>
+      </p:pic>
+      <p:cxnSp>
+        <p:nvCxnSpPr>
+          <p:cNvPr id="13" name="Straight Arrow Connector 12">
+            <a:extLst>
+              <a:ext uri="{FF2B5EF4-FFF2-40B4-BE49-F238E27FC236}">
+                <a16:creationId xmlns:a16="http://schemas.microsoft.com/office/drawing/2014/main" id="{CE919392-6E5C-CE49-B835-04CDD53A8CDB}"/>
+              </a:ext>
+            </a:extLst>
+          </p:cNvPr>
+          <p:cNvCxnSpPr>
+            <a:cxnSpLocks/>
+          </p:cNvCxnSpPr>
+          <p:nvPr/>
+        </p:nvCxnSpPr>
+        <p:spPr>
+          <a:xfrm>
+            <a:off x="7903778" y="3866357"/>
+            <a:ext cx="936000" cy="0"/>
+          </a:xfrm>
+          <a:prstGeom prst="straightConnector1">
+            <a:avLst/>
+          </a:prstGeom>
+          <a:ln>
+            <a:tailEnd type="triangle"/>
+          </a:ln>
+        </p:spPr>
+        <p:style>
+          <a:lnRef idx="1">
+            <a:schemeClr val="dk1"/>
+          </a:lnRef>
+          <a:fillRef idx="0">
+            <a:schemeClr val="dk1"/>
+          </a:fillRef>
+          <a:effectRef idx="0">
+            <a:schemeClr val="dk1"/>
+          </a:effectRef>
+          <a:fontRef idx="minor">
+            <a:schemeClr val="tx1"/>
+          </a:fontRef>
+        </p:style>
+      </p:cxnSp>
     </p:spTree>
     <p:extLst>
       <p:ext uri="{BB962C8B-B14F-4D97-AF65-F5344CB8AC3E}">
-        <p14:creationId xmlns:p14="http://schemas.microsoft.com/office/powerpoint/2010/main" val="1686906663"/>
+        <p14:creationId xmlns:p14="http://schemas.microsoft.com/office/powerpoint/2010/main" val="3551330668"/>
       </p:ext>
     </p:extLst>
   </p:cSld>
@@ -9935,7 +10687,7 @@
           <p:cNvPr id="2" name="Title 1">
             <a:extLst>
               <a:ext uri="{FF2B5EF4-FFF2-40B4-BE49-F238E27FC236}">
-                <a16:creationId xmlns:a16="http://schemas.microsoft.com/office/drawing/2014/main" id="{D6233FA0-276B-5641-8FC4-647FCF530E63}"/>
+                <a16:creationId xmlns:a16="http://schemas.microsoft.com/office/drawing/2014/main" id="{1F003A22-4D9A-0447-A40F-310033CD2ED8}"/>
               </a:ext>
             </a:extLst>
           </p:cNvPr>
@@ -9953,69 +10705,46 @@
           <a:p>
             <a:r>
               <a:rPr lang="tr-TR" dirty="0"/>
-              <a:t>Nesne Tipleri</a:t>
-            </a:r>
-          </a:p>
-        </p:txBody>
-      </p:sp>
-      <p:sp>
-        <p:nvSpPr>
-          <p:cNvPr id="3" name="Content Placeholder 2">
-            <a:extLst>
-              <a:ext uri="{FF2B5EF4-FFF2-40B4-BE49-F238E27FC236}">
-                <a16:creationId xmlns:a16="http://schemas.microsoft.com/office/drawing/2014/main" id="{FA4F0C0F-5F20-4B43-BE12-5B5D5618F3B1}"/>
-              </a:ext>
-            </a:extLst>
-          </p:cNvPr>
-          <p:cNvSpPr>
-            <a:spLocks noGrp="1"/>
-          </p:cNvSpPr>
+              <a:t>Problemler</a:t>
+            </a:r>
+          </a:p>
+        </p:txBody>
+      </p:sp>
+      <p:pic>
+        <p:nvPicPr>
+          <p:cNvPr id="7" name="Content Placeholder 6" descr="A screenshot of a social media post&#10;&#10;Description automatically generated">
+            <a:extLst>
+              <a:ext uri="{FF2B5EF4-FFF2-40B4-BE49-F238E27FC236}">
+                <a16:creationId xmlns:a16="http://schemas.microsoft.com/office/drawing/2014/main" id="{3D58CA48-FD7F-5449-87D4-576D5009E84A}"/>
+              </a:ext>
+            </a:extLst>
+          </p:cNvPr>
+          <p:cNvPicPr>
+            <a:picLocks noGrp="1" noChangeAspect="1"/>
+          </p:cNvPicPr>
           <p:nvPr>
             <p:ph idx="1"/>
           </p:nvPr>
-        </p:nvSpPr>
-        <p:spPr/>
-        <p:txBody>
-          <a:bodyPr/>
-          <a:lstStyle/>
-          <a:p>
-            <a:r>
-              <a:rPr lang="tr-TR" dirty="0"/>
-              <a:t>Skaler nesneler</a:t>
-            </a:r>
-          </a:p>
-          <a:p>
-            <a:pPr lvl="1"/>
-            <a:r>
-              <a:rPr lang="tr-TR" dirty="0"/>
-              <a:t>Daha küçük parçalara bölünemeyen tip. Örneğin numaralar ve karakterler.</a:t>
-            </a:r>
-          </a:p>
-          <a:p>
-            <a:pPr lvl="1"/>
-            <a:endParaRPr lang="tr-TR" dirty="0"/>
-          </a:p>
-          <a:p>
-            <a:r>
-              <a:rPr lang="tr-TR" dirty="0"/>
-              <a:t>Skaler olmayan nesneler</a:t>
-            </a:r>
-          </a:p>
-          <a:p>
-            <a:pPr lvl="1"/>
-            <a:r>
-              <a:rPr lang="tr-TR" dirty="0"/>
-              <a:t>Daha küçük parçalara ayrılabilen nesneler. Örneğin Listeler.</a:t>
-            </a:r>
-          </a:p>
-        </p:txBody>
-      </p:sp>
+        </p:nvPicPr>
+        <p:blipFill>
+          <a:blip r:embed="rId2"/>
+          <a:stretch>
+            <a:fillRect/>
+          </a:stretch>
+        </p:blipFill>
+        <p:spPr>
+          <a:xfrm>
+            <a:off x="838200" y="2170870"/>
+            <a:ext cx="10515600" cy="3660848"/>
+          </a:xfrm>
+        </p:spPr>
+      </p:pic>
       <p:sp>
         <p:nvSpPr>
           <p:cNvPr id="4" name="Date Placeholder 3">
             <a:extLst>
               <a:ext uri="{FF2B5EF4-FFF2-40B4-BE49-F238E27FC236}">
-                <a16:creationId xmlns:a16="http://schemas.microsoft.com/office/drawing/2014/main" id="{10915C89-F4E9-1047-B209-67C619CC86CC}"/>
+                <a16:creationId xmlns:a16="http://schemas.microsoft.com/office/drawing/2014/main" id="{DB386B88-EE4B-E349-AFCE-6DD34503449C}"/>
               </a:ext>
             </a:extLst>
           </p:cNvPr>
@@ -10044,7 +10773,7 @@
           <p:cNvPr id="5" name="Slide Number Placeholder 4">
             <a:extLst>
               <a:ext uri="{FF2B5EF4-FFF2-40B4-BE49-F238E27FC236}">
-                <a16:creationId xmlns:a16="http://schemas.microsoft.com/office/drawing/2014/main" id="{C7CA4345-7CD2-5546-BA34-32EB80B1D069}"/>
+                <a16:creationId xmlns:a16="http://schemas.microsoft.com/office/drawing/2014/main" id="{ADF7C6E1-DA4D-AD4F-86E2-6CBB90700F07}"/>
               </a:ext>
             </a:extLst>
           </p:cNvPr>
@@ -10071,7 +10800,7 @@
     </p:spTree>
     <p:extLst>
       <p:ext uri="{BB962C8B-B14F-4D97-AF65-F5344CB8AC3E}">
-        <p14:creationId xmlns:p14="http://schemas.microsoft.com/office/powerpoint/2010/main" val="956917466"/>
+        <p14:creationId xmlns:p14="http://schemas.microsoft.com/office/powerpoint/2010/main" val="1781110040"/>
       </p:ext>
     </p:extLst>
   </p:cSld>
@@ -10103,7 +10832,7 @@
           <p:cNvPr id="2" name="Title 1">
             <a:extLst>
               <a:ext uri="{FF2B5EF4-FFF2-40B4-BE49-F238E27FC236}">
-                <a16:creationId xmlns:a16="http://schemas.microsoft.com/office/drawing/2014/main" id="{F4015C51-6854-FA47-ABE8-708AF75CE8D6}"/>
+                <a16:creationId xmlns:a16="http://schemas.microsoft.com/office/drawing/2014/main" id="{8E282CD7-3A56-E64F-93CA-D6C29A00E8AC}"/>
               </a:ext>
             </a:extLst>
           </p:cNvPr>
@@ -10120,10 +10849,9 @@
           <a:lstStyle/>
           <a:p>
             <a:r>
-              <a:rPr lang="en-US" dirty="0"/>
-              <a:t>Bilgi Tipleri </a:t>
-            </a:r>
-            <a:endParaRPr dirty="0"/>
+              <a:rPr lang="tr-TR" dirty="0"/>
+              <a:t>Bilgi veri yapıları ile nasıl temsil edilir?</a:t>
+            </a:r>
           </a:p>
         </p:txBody>
       </p:sp>
@@ -10132,7 +10860,7 @@
           <p:cNvPr id="3" name="Content Placeholder 2">
             <a:extLst>
               <a:ext uri="{FF2B5EF4-FFF2-40B4-BE49-F238E27FC236}">
-                <a16:creationId xmlns:a16="http://schemas.microsoft.com/office/drawing/2014/main" id="{5839892F-1FCA-2049-8A37-4A8130C0B3CE}"/>
+                <a16:creationId xmlns:a16="http://schemas.microsoft.com/office/drawing/2014/main" id="{018E57A1-5960-C440-B49E-AEF88E9C6264}"/>
               </a:ext>
             </a:extLst>
           </p:cNvPr>
@@ -10145,24 +10873,19 @@
         </p:nvSpPr>
         <p:spPr/>
         <p:txBody>
-          <a:bodyPr>
-            <a:normAutofit/>
-          </a:bodyPr>
-          <a:lstStyle/>
-          <a:p>
-            <a:pPr marL="0" indent="0">
-              <a:buNone/>
-            </a:pPr>
+          <a:bodyPr/>
+          <a:lstStyle/>
+          <a:p>
             <a:r>
               <a:rPr lang="tr-TR" dirty="0"/>
-              <a:t>Bildirimsel Bilgi</a:t>
+              <a:t>Objeler (Nesneler)</a:t>
             </a:r>
           </a:p>
           <a:p>
             <a:pPr lvl="1"/>
             <a:r>
               <a:rPr lang="tr-TR" dirty="0"/>
-              <a:t>Gerçeklerin ifade edilmesi. Örneğin ’Ders sonunda bir kişi kahve kazanacak.’</a:t>
+              <a:t>Belirli birtakım metotlara ve/veya niteliklere sahip olan öğelere nesne adı verilir. Yani ‘nesne’ kelimesi, içinde birtakım metot ve/veya nitelikler barındıran öğeleri tanımlamak için kullanılan bir tabirden, basit bir isimlendirmeden ibarettir.</a:t>
             </a:r>
           </a:p>
           <a:p>
@@ -10170,33 +10893,31 @@
             <a:endParaRPr lang="tr-TR" dirty="0"/>
           </a:p>
           <a:p>
-            <a:pPr marL="0" indent="0">
-              <a:buNone/>
-            </a:pPr>
+            <a:pPr lvl="1"/>
             <a:r>
               <a:rPr lang="tr-TR" dirty="0"/>
-              <a:t>Emirsel Bilgi</a:t>
+              <a:t>Batuhan bir insandır.</a:t>
+            </a:r>
+          </a:p>
+          <a:p>
+            <a:pPr lvl="2"/>
+            <a:r>
+              <a:rPr lang="tr-TR" dirty="0"/>
+              <a:t>Konuşabilir, dinleyebilir, koşabilir, kod yazabilir etc.</a:t>
             </a:r>
           </a:p>
           <a:p>
             <a:pPr lvl="1"/>
             <a:r>
               <a:rPr lang="tr-TR" dirty="0"/>
-              <a:t>Bir tarif verilmesi veya nasıl yapılacağının belirtilmesi.</a:t>
+              <a:t>Bilgisayar bir makinedir.</a:t>
             </a:r>
           </a:p>
           <a:p>
             <a:pPr lvl="2"/>
             <a:r>
               <a:rPr lang="tr-TR" dirty="0"/>
-              <a:t>1- Batuhan Python üzerinden rastgele bir sayı üretir.</a:t>
-            </a:r>
-          </a:p>
-          <a:p>
-            <a:pPr lvl="2"/>
-            <a:r>
-              <a:rPr lang="tr-TR" dirty="0"/>
-              <a:t>2- Batuhan kişi listesinden sayıyı bulur ve kazananı belirler.</a:t>
+              <a:t>Bozulabilir, kırılabilir, işlem yapabilir etc.</a:t>
             </a:r>
           </a:p>
         </p:txBody>
@@ -10206,7 +10927,7 @@
           <p:cNvPr id="4" name="Date Placeholder 3">
             <a:extLst>
               <a:ext uri="{FF2B5EF4-FFF2-40B4-BE49-F238E27FC236}">
-                <a16:creationId xmlns:a16="http://schemas.microsoft.com/office/drawing/2014/main" id="{15BF110A-69F9-BF4D-B391-B27C78BA3EC5}"/>
+                <a16:creationId xmlns:a16="http://schemas.microsoft.com/office/drawing/2014/main" id="{8BDF3458-A264-DB46-9063-E9BEF0B6D6E3}"/>
               </a:ext>
             </a:extLst>
           </p:cNvPr>
@@ -10235,7 +10956,7 @@
           <p:cNvPr id="5" name="Slide Number Placeholder 4">
             <a:extLst>
               <a:ext uri="{FF2B5EF4-FFF2-40B4-BE49-F238E27FC236}">
-                <a16:creationId xmlns:a16="http://schemas.microsoft.com/office/drawing/2014/main" id="{6A634B4C-18E4-3F42-9685-D3CFB4337D3F}"/>
+                <a16:creationId xmlns:a16="http://schemas.microsoft.com/office/drawing/2014/main" id="{5DF9BA5E-BB07-8B4F-9B33-8759238E2C2F}"/>
               </a:ext>
             </a:extLst>
           </p:cNvPr>
@@ -10262,7 +10983,7 @@
     </p:spTree>
     <p:extLst>
       <p:ext uri="{BB962C8B-B14F-4D97-AF65-F5344CB8AC3E}">
-        <p14:creationId xmlns:p14="http://schemas.microsoft.com/office/powerpoint/2010/main" val="1118790915"/>
+        <p14:creationId xmlns:p14="http://schemas.microsoft.com/office/powerpoint/2010/main" val="1686906663"/>
       </p:ext>
     </p:extLst>
   </p:cSld>

</xml_diff>